<commit_message>
Modify description of session pagination.#1240
</commit_message>
<xml_diff>
--- a/source/ArchitectureInDetail/WebApplicationDetail/images_Pagination/materialPagination.pptx
+++ b/source/ArchitectureInDetail/WebApplicationDetail/images_Pagination/materialPagination.pptx
@@ -254,7 +254,7 @@
             <a:fld id="{3BB47352-BF5A-4CD2-B029-996118CD8E01}" type="datetimeFigureOut">
               <a:rPr kumimoji="1" lang="ja-JP" altLang="en-US" smtClean="0"/>
               <a:pPr/>
-              <a:t>2016/10/19</a:t>
+              <a:t>2016/10/20</a:t>
             </a:fld>
             <a:endParaRPr kumimoji="1" lang="ja-JP" altLang="en-US"/>
           </a:p>
@@ -737,7 +737,7 @@
             <a:fld id="{7B9B12EC-6AA0-374B-A2D3-850081A07A26}" type="datetimeFigureOut">
               <a:rPr kumimoji="1" lang="ja-JP" altLang="en-US" smtClean="0"/>
               <a:pPr/>
-              <a:t>2016/10/19</a:t>
+              <a:t>2016/10/20</a:t>
             </a:fld>
             <a:endParaRPr kumimoji="1" lang="ja-JP" altLang="en-US"/>
           </a:p>
@@ -941,7 +941,7 @@
             <a:fld id="{7B9B12EC-6AA0-374B-A2D3-850081A07A26}" type="datetimeFigureOut">
               <a:rPr kumimoji="1" lang="ja-JP" altLang="en-US" smtClean="0"/>
               <a:pPr/>
-              <a:t>2016/10/19</a:t>
+              <a:t>2016/10/20</a:t>
             </a:fld>
             <a:endParaRPr kumimoji="1" lang="ja-JP" altLang="en-US"/>
           </a:p>
@@ -1155,7 +1155,7 @@
             <a:fld id="{7B9B12EC-6AA0-374B-A2D3-850081A07A26}" type="datetimeFigureOut">
               <a:rPr kumimoji="1" lang="ja-JP" altLang="en-US" smtClean="0"/>
               <a:pPr/>
-              <a:t>2016/10/19</a:t>
+              <a:t>2016/10/20</a:t>
             </a:fld>
             <a:endParaRPr kumimoji="1" lang="ja-JP" altLang="en-US"/>
           </a:p>
@@ -1359,7 +1359,7 @@
             <a:fld id="{7B9B12EC-6AA0-374B-A2D3-850081A07A26}" type="datetimeFigureOut">
               <a:rPr kumimoji="1" lang="ja-JP" altLang="en-US" smtClean="0"/>
               <a:pPr/>
-              <a:t>2016/10/19</a:t>
+              <a:t>2016/10/20</a:t>
             </a:fld>
             <a:endParaRPr kumimoji="1" lang="ja-JP" altLang="en-US"/>
           </a:p>
@@ -1607,7 +1607,7 @@
             <a:fld id="{7B9B12EC-6AA0-374B-A2D3-850081A07A26}" type="datetimeFigureOut">
               <a:rPr kumimoji="1" lang="ja-JP" altLang="en-US" smtClean="0"/>
               <a:pPr/>
-              <a:t>2016/10/19</a:t>
+              <a:t>2016/10/20</a:t>
             </a:fld>
             <a:endParaRPr kumimoji="1" lang="ja-JP" altLang="en-US"/>
           </a:p>
@@ -1961,7 +1961,7 @@
             <a:fld id="{7B9B12EC-6AA0-374B-A2D3-850081A07A26}" type="datetimeFigureOut">
               <a:rPr kumimoji="1" lang="ja-JP" altLang="en-US" smtClean="0"/>
               <a:pPr/>
-              <a:t>2016/10/19</a:t>
+              <a:t>2016/10/20</a:t>
             </a:fld>
             <a:endParaRPr kumimoji="1" lang="ja-JP" altLang="en-US"/>
           </a:p>
@@ -2449,7 +2449,7 @@
             <a:fld id="{7B9B12EC-6AA0-374B-A2D3-850081A07A26}" type="datetimeFigureOut">
               <a:rPr kumimoji="1" lang="ja-JP" altLang="en-US" smtClean="0"/>
               <a:pPr/>
-              <a:t>2016/10/19</a:t>
+              <a:t>2016/10/20</a:t>
             </a:fld>
             <a:endParaRPr kumimoji="1" lang="ja-JP" altLang="en-US"/>
           </a:p>
@@ -2569,7 +2569,7 @@
             <a:fld id="{7B9B12EC-6AA0-374B-A2D3-850081A07A26}" type="datetimeFigureOut">
               <a:rPr kumimoji="1" lang="ja-JP" altLang="en-US" smtClean="0"/>
               <a:pPr/>
-              <a:t>2016/10/19</a:t>
+              <a:t>2016/10/20</a:t>
             </a:fld>
             <a:endParaRPr kumimoji="1" lang="ja-JP" altLang="en-US"/>
           </a:p>
@@ -2666,7 +2666,7 @@
             <a:fld id="{7B9B12EC-6AA0-374B-A2D3-850081A07A26}" type="datetimeFigureOut">
               <a:rPr kumimoji="1" lang="ja-JP" altLang="en-US" smtClean="0"/>
               <a:pPr/>
-              <a:t>2016/10/19</a:t>
+              <a:t>2016/10/20</a:t>
             </a:fld>
             <a:endParaRPr kumimoji="1" lang="ja-JP" altLang="en-US"/>
           </a:p>
@@ -2977,7 +2977,7 @@
             <a:fld id="{7B9B12EC-6AA0-374B-A2D3-850081A07A26}" type="datetimeFigureOut">
               <a:rPr kumimoji="1" lang="ja-JP" altLang="en-US" smtClean="0"/>
               <a:pPr/>
-              <a:t>2016/10/19</a:t>
+              <a:t>2016/10/20</a:t>
             </a:fld>
             <a:endParaRPr kumimoji="1" lang="ja-JP" altLang="en-US"/>
           </a:p>
@@ -3232,7 +3232,7 @@
             <a:fld id="{7B9B12EC-6AA0-374B-A2D3-850081A07A26}" type="datetimeFigureOut">
               <a:rPr kumimoji="1" lang="ja-JP" altLang="en-US" smtClean="0"/>
               <a:pPr/>
-              <a:t>2016/10/19</a:t>
+              <a:t>2016/10/20</a:t>
             </a:fld>
             <a:endParaRPr kumimoji="1" lang="ja-JP" altLang="en-US"/>
           </a:p>
@@ -3479,7 +3479,7 @@
             <a:fld id="{7B9B12EC-6AA0-374B-A2D3-850081A07A26}" type="datetimeFigureOut">
               <a:rPr kumimoji="1" lang="ja-JP" altLang="en-US" smtClean="0"/>
               <a:pPr/>
-              <a:t>2016/10/19</a:t>
+              <a:t>2016/10/20</a:t>
             </a:fld>
             <a:endParaRPr kumimoji="1" lang="ja-JP" altLang="en-US"/>
           </a:p>
@@ -7407,7 +7407,15 @@
                     <a:prstClr val="black"/>
                   </a:solidFill>
                 </a:rPr>
-                <a:t>(5) list(GET)</a:t>
+                <a:t>list(GET</a:t>
+              </a:r>
+              <a:r>
+                <a:rPr lang="en-US" altLang="ja-JP" sz="1600" dirty="0" smtClean="0">
+                  <a:solidFill>
+                    <a:prstClr val="black"/>
+                  </a:solidFill>
+                </a:rPr>
+                <a:t>)</a:t>
               </a:r>
               <a:endParaRPr lang="ja-JP" altLang="en-US" sz="1600" dirty="0">
                 <a:solidFill>
@@ -7556,7 +7564,7 @@
         </p:nvSpPr>
         <p:spPr>
           <a:xfrm>
-            <a:off x="1019957" y="1907618"/>
+            <a:off x="1017575" y="1907618"/>
             <a:ext cx="1942218" cy="824449"/>
           </a:xfrm>
           <a:prstGeom prst="rect">
@@ -7878,7 +7886,7 @@
         <p:spPr>
           <a:xfrm>
             <a:off x="1987730" y="1567769"/>
-            <a:ext cx="3336" cy="339849"/>
+            <a:ext cx="954" cy="339849"/>
           </a:xfrm>
           <a:prstGeom prst="straightConnector1">
             <a:avLst/>
@@ -7907,19 +7915,19 @@
         <p:nvCxnSpPr>
           <p:cNvPr id="36" name="カギ線コネクタ 35"/>
           <p:cNvCxnSpPr>
-            <a:stCxn id="84" idx="1"/>
+            <a:stCxn id="89" idx="1"/>
             <a:endCxn id="60" idx="1"/>
           </p:cNvCxnSpPr>
           <p:nvPr/>
         </p:nvCxnSpPr>
         <p:spPr>
           <a:xfrm rot="10800000">
-            <a:off x="1016622" y="3197842"/>
-            <a:ext cx="4331" cy="2161824"/>
+            <a:off x="1016622" y="3197843"/>
+            <a:ext cx="668415" cy="2406239"/>
           </a:xfrm>
           <a:prstGeom prst="bentConnector3">
             <a:avLst>
-              <a:gd name="adj1" fmla="val 6917710"/>
+              <a:gd name="adj1" fmla="val 134200"/>
             </a:avLst>
           </a:prstGeom>
           <a:ln>
@@ -7988,7 +7996,7 @@
         </p:nvCxnSpPr>
         <p:spPr>
           <a:xfrm>
-            <a:off x="2962175" y="2319843"/>
+            <a:off x="2959793" y="2319843"/>
             <a:ext cx="1574817" cy="714213"/>
           </a:xfrm>
           <a:prstGeom prst="straightConnector1">

</xml_diff>

<commit_message>
Fix the review comment.#1240
</commit_message>
<xml_diff>
--- a/source/ArchitectureInDetail/WebApplicationDetail/images_Pagination/materialPagination.pptx
+++ b/source/ArchitectureInDetail/WebApplicationDetail/images_Pagination/materialPagination.pptx
@@ -254,7 +254,7 @@
             <a:fld id="{3BB47352-BF5A-4CD2-B029-996118CD8E01}" type="datetimeFigureOut">
               <a:rPr kumimoji="1" lang="ja-JP" altLang="en-US" smtClean="0"/>
               <a:pPr/>
-              <a:t>2016/10/20</a:t>
+              <a:t>2016/10/28</a:t>
             </a:fld>
             <a:endParaRPr kumimoji="1" lang="ja-JP" altLang="en-US"/>
           </a:p>
@@ -737,7 +737,7 @@
             <a:fld id="{7B9B12EC-6AA0-374B-A2D3-850081A07A26}" type="datetimeFigureOut">
               <a:rPr kumimoji="1" lang="ja-JP" altLang="en-US" smtClean="0"/>
               <a:pPr/>
-              <a:t>2016/10/20</a:t>
+              <a:t>2016/10/28</a:t>
             </a:fld>
             <a:endParaRPr kumimoji="1" lang="ja-JP" altLang="en-US"/>
           </a:p>
@@ -941,7 +941,7 @@
             <a:fld id="{7B9B12EC-6AA0-374B-A2D3-850081A07A26}" type="datetimeFigureOut">
               <a:rPr kumimoji="1" lang="ja-JP" altLang="en-US" smtClean="0"/>
               <a:pPr/>
-              <a:t>2016/10/20</a:t>
+              <a:t>2016/10/28</a:t>
             </a:fld>
             <a:endParaRPr kumimoji="1" lang="ja-JP" altLang="en-US"/>
           </a:p>
@@ -1155,7 +1155,7 @@
             <a:fld id="{7B9B12EC-6AA0-374B-A2D3-850081A07A26}" type="datetimeFigureOut">
               <a:rPr kumimoji="1" lang="ja-JP" altLang="en-US" smtClean="0"/>
               <a:pPr/>
-              <a:t>2016/10/20</a:t>
+              <a:t>2016/10/28</a:t>
             </a:fld>
             <a:endParaRPr kumimoji="1" lang="ja-JP" altLang="en-US"/>
           </a:p>
@@ -1359,7 +1359,7 @@
             <a:fld id="{7B9B12EC-6AA0-374B-A2D3-850081A07A26}" type="datetimeFigureOut">
               <a:rPr kumimoji="1" lang="ja-JP" altLang="en-US" smtClean="0"/>
               <a:pPr/>
-              <a:t>2016/10/20</a:t>
+              <a:t>2016/10/28</a:t>
             </a:fld>
             <a:endParaRPr kumimoji="1" lang="ja-JP" altLang="en-US"/>
           </a:p>
@@ -1607,7 +1607,7 @@
             <a:fld id="{7B9B12EC-6AA0-374B-A2D3-850081A07A26}" type="datetimeFigureOut">
               <a:rPr kumimoji="1" lang="ja-JP" altLang="en-US" smtClean="0"/>
               <a:pPr/>
-              <a:t>2016/10/20</a:t>
+              <a:t>2016/10/28</a:t>
             </a:fld>
             <a:endParaRPr kumimoji="1" lang="ja-JP" altLang="en-US"/>
           </a:p>
@@ -1961,7 +1961,7 @@
             <a:fld id="{7B9B12EC-6AA0-374B-A2D3-850081A07A26}" type="datetimeFigureOut">
               <a:rPr kumimoji="1" lang="ja-JP" altLang="en-US" smtClean="0"/>
               <a:pPr/>
-              <a:t>2016/10/20</a:t>
+              <a:t>2016/10/28</a:t>
             </a:fld>
             <a:endParaRPr kumimoji="1" lang="ja-JP" altLang="en-US"/>
           </a:p>
@@ -2449,7 +2449,7 @@
             <a:fld id="{7B9B12EC-6AA0-374B-A2D3-850081A07A26}" type="datetimeFigureOut">
               <a:rPr kumimoji="1" lang="ja-JP" altLang="en-US" smtClean="0"/>
               <a:pPr/>
-              <a:t>2016/10/20</a:t>
+              <a:t>2016/10/28</a:t>
             </a:fld>
             <a:endParaRPr kumimoji="1" lang="ja-JP" altLang="en-US"/>
           </a:p>
@@ -2569,7 +2569,7 @@
             <a:fld id="{7B9B12EC-6AA0-374B-A2D3-850081A07A26}" type="datetimeFigureOut">
               <a:rPr kumimoji="1" lang="ja-JP" altLang="en-US" smtClean="0"/>
               <a:pPr/>
-              <a:t>2016/10/20</a:t>
+              <a:t>2016/10/28</a:t>
             </a:fld>
             <a:endParaRPr kumimoji="1" lang="ja-JP" altLang="en-US"/>
           </a:p>
@@ -2666,7 +2666,7 @@
             <a:fld id="{7B9B12EC-6AA0-374B-A2D3-850081A07A26}" type="datetimeFigureOut">
               <a:rPr kumimoji="1" lang="ja-JP" altLang="en-US" smtClean="0"/>
               <a:pPr/>
-              <a:t>2016/10/20</a:t>
+              <a:t>2016/10/28</a:t>
             </a:fld>
             <a:endParaRPr kumimoji="1" lang="ja-JP" altLang="en-US"/>
           </a:p>
@@ -2977,7 +2977,7 @@
             <a:fld id="{7B9B12EC-6AA0-374B-A2D3-850081A07A26}" type="datetimeFigureOut">
               <a:rPr kumimoji="1" lang="ja-JP" altLang="en-US" smtClean="0"/>
               <a:pPr/>
-              <a:t>2016/10/20</a:t>
+              <a:t>2016/10/28</a:t>
             </a:fld>
             <a:endParaRPr kumimoji="1" lang="ja-JP" altLang="en-US"/>
           </a:p>
@@ -3232,7 +3232,7 @@
             <a:fld id="{7B9B12EC-6AA0-374B-A2D3-850081A07A26}" type="datetimeFigureOut">
               <a:rPr kumimoji="1" lang="ja-JP" altLang="en-US" smtClean="0"/>
               <a:pPr/>
-              <a:t>2016/10/20</a:t>
+              <a:t>2016/10/28</a:t>
             </a:fld>
             <a:endParaRPr kumimoji="1" lang="ja-JP" altLang="en-US"/>
           </a:p>
@@ -3479,7 +3479,7 @@
             <a:fld id="{7B9B12EC-6AA0-374B-A2D3-850081A07A26}" type="datetimeFigureOut">
               <a:rPr kumimoji="1" lang="ja-JP" altLang="en-US" smtClean="0"/>
               <a:pPr/>
-              <a:t>2016/10/20</a:t>
+              <a:t>2016/10/28</a:t>
             </a:fld>
             <a:endParaRPr kumimoji="1" lang="ja-JP" altLang="en-US"/>
           </a:p>
@@ -7137,14 +7137,60 @@
       </p:grpSpPr>
       <p:sp>
         <p:nvSpPr>
+          <p:cNvPr id="24" name="正方形/長方形 23"/>
+          <p:cNvSpPr/>
+          <p:nvPr/>
+        </p:nvSpPr>
+        <p:spPr>
+          <a:xfrm>
+            <a:off x="744611" y="3415101"/>
+            <a:ext cx="2432861" cy="852099"/>
+          </a:xfrm>
+          <a:prstGeom prst="rect">
+            <a:avLst/>
+          </a:prstGeom>
+        </p:spPr>
+        <p:style>
+          <a:lnRef idx="2">
+            <a:schemeClr val="accent1"/>
+          </a:lnRef>
+          <a:fillRef idx="1">
+            <a:schemeClr val="lt1"/>
+          </a:fillRef>
+          <a:effectRef idx="0">
+            <a:schemeClr val="accent1"/>
+          </a:effectRef>
+          <a:fontRef idx="minor">
+            <a:schemeClr val="dk1"/>
+          </a:fontRef>
+        </p:style>
+        <p:txBody>
+          <a:bodyPr rtlCol="0" anchor="t" anchorCtr="1"/>
+          <a:lstStyle/>
+          <a:p>
+            <a:pPr algn="ctr"/>
+            <a:r>
+              <a:rPr lang="en-US" altLang="ja-JP" sz="1600" dirty="0" err="1" smtClean="0"/>
+              <a:t>ArticleSearchCriteriaForm</a:t>
+            </a:r>
+            <a:endParaRPr lang="ja-JP" altLang="en-US" sz="1600" dirty="0">
+              <a:solidFill>
+                <a:prstClr val="black"/>
+              </a:solidFill>
+            </a:endParaRPr>
+          </a:p>
+        </p:txBody>
+      </p:sp>
+      <p:sp>
+        <p:nvSpPr>
           <p:cNvPr id="15" name="角丸四角形 14"/>
           <p:cNvSpPr/>
           <p:nvPr/>
         </p:nvSpPr>
         <p:spPr>
           <a:xfrm>
-            <a:off x="409577" y="96645"/>
-            <a:ext cx="3171824" cy="6244682"/>
+            <a:off x="363011" y="558799"/>
+            <a:ext cx="3171824" cy="4775201"/>
           </a:xfrm>
           <a:prstGeom prst="roundRect">
             <a:avLst/>
@@ -7195,128 +7241,113 @@
           </a:p>
         </p:txBody>
       </p:sp>
-      <p:grpSp>
-        <p:nvGrpSpPr>
-          <p:cNvPr id="50" name="グループ化 49"/>
-          <p:cNvGrpSpPr/>
-          <p:nvPr/>
-        </p:nvGrpSpPr>
-        <p:grpSpPr>
-          <a:xfrm>
-            <a:off x="4414675" y="1883025"/>
-            <a:ext cx="3100549" cy="2060326"/>
-            <a:chOff x="4414675" y="1711575"/>
-            <a:chExt cx="3100549" cy="2060326"/>
-          </a:xfrm>
-        </p:grpSpPr>
-        <p:sp>
-          <p:nvSpPr>
-            <p:cNvPr id="73" name="角丸四角形 72"/>
-            <p:cNvSpPr/>
-            <p:nvPr/>
-          </p:nvSpPr>
-          <p:spPr>
-            <a:xfrm>
-              <a:off x="4414675" y="1711575"/>
-              <a:ext cx="3100549" cy="2060326"/>
-            </a:xfrm>
-            <a:prstGeom prst="roundRect">
-              <a:avLst/>
-            </a:prstGeom>
-          </p:spPr>
-          <p:style>
-            <a:lnRef idx="1">
-              <a:schemeClr val="accent2"/>
-            </a:lnRef>
-            <a:fillRef idx="3">
-              <a:schemeClr val="accent2"/>
-            </a:fillRef>
-            <a:effectRef idx="2">
-              <a:schemeClr val="accent2"/>
-            </a:effectRef>
-            <a:fontRef idx="minor">
-              <a:schemeClr val="lt1"/>
-            </a:fontRef>
-          </p:style>
-          <p:txBody>
-            <a:bodyPr rtlCol="0" anchor="t" anchorCtr="0"/>
-            <a:lstStyle/>
-            <a:p>
-              <a:pPr algn="ctr"/>
-              <a:r>
-                <a:rPr kumimoji="1" lang="en-US" altLang="ja-JP" sz="1600" dirty="0" smtClean="0"/>
-                <a:t>&lt;servlet&gt;</a:t>
-              </a:r>
-            </a:p>
-            <a:p>
-              <a:pPr algn="ctr"/>
-              <a:r>
-                <a:rPr kumimoji="1" lang="en-US" altLang="ja-JP" dirty="0" err="1" smtClean="0"/>
-                <a:t>HttpSession</a:t>
-              </a:r>
-              <a:endParaRPr kumimoji="1" lang="ja-JP" altLang="en-US" sz="1200" dirty="0"/>
-            </a:p>
-          </p:txBody>
-        </p:sp>
-        <p:sp>
-          <p:nvSpPr>
-            <p:cNvPr id="74" name="角丸四角形 73"/>
-            <p:cNvSpPr/>
-            <p:nvPr/>
-          </p:nvSpPr>
-          <p:spPr>
-            <a:xfrm>
-              <a:off x="4569012" y="2593553"/>
-              <a:ext cx="2704740" cy="857130"/>
-            </a:xfrm>
-            <a:prstGeom prst="roundRect">
-              <a:avLst/>
-            </a:prstGeom>
-          </p:spPr>
-          <p:style>
-            <a:lnRef idx="1">
-              <a:schemeClr val="accent1"/>
-            </a:lnRef>
-            <a:fillRef idx="3">
-              <a:schemeClr val="accent1"/>
-            </a:fillRef>
-            <a:effectRef idx="2">
-              <a:schemeClr val="accent1"/>
-            </a:effectRef>
-            <a:fontRef idx="minor">
-              <a:schemeClr val="lt1"/>
-            </a:fontRef>
-          </p:style>
-          <p:txBody>
-            <a:bodyPr rtlCol="0" anchor="ctr" anchorCtr="1"/>
-            <a:lstStyle/>
-            <a:p>
-              <a:pPr algn="ctr"/>
-              <a:r>
-                <a:rPr lang="en-US" altLang="ja-JP" dirty="0" err="1"/>
-                <a:t>ArticleSearchCriteriaForm</a:t>
-              </a:r>
-              <a:endParaRPr lang="ja-JP" altLang="en-US" dirty="0">
-                <a:solidFill>
-                  <a:prstClr val="white"/>
-                </a:solidFill>
-              </a:endParaRPr>
-            </a:p>
-          </p:txBody>
-        </p:sp>
-      </p:grpSp>
+      <p:sp>
+        <p:nvSpPr>
+          <p:cNvPr id="73" name="角丸四角形 72"/>
+          <p:cNvSpPr/>
+          <p:nvPr/>
+        </p:nvSpPr>
+        <p:spPr>
+          <a:xfrm>
+            <a:off x="4414675" y="1756025"/>
+            <a:ext cx="3634303" cy="2060326"/>
+          </a:xfrm>
+          <a:prstGeom prst="roundRect">
+            <a:avLst/>
+          </a:prstGeom>
+        </p:spPr>
+        <p:style>
+          <a:lnRef idx="1">
+            <a:schemeClr val="accent2"/>
+          </a:lnRef>
+          <a:fillRef idx="3">
+            <a:schemeClr val="accent2"/>
+          </a:fillRef>
+          <a:effectRef idx="2">
+            <a:schemeClr val="accent2"/>
+          </a:effectRef>
+          <a:fontRef idx="minor">
+            <a:schemeClr val="lt1"/>
+          </a:fontRef>
+        </p:style>
+        <p:txBody>
+          <a:bodyPr rtlCol="0" anchor="t" anchorCtr="0"/>
+          <a:lstStyle/>
+          <a:p>
+            <a:pPr algn="ctr"/>
+            <a:r>
+              <a:rPr kumimoji="1" lang="en-US" altLang="ja-JP" sz="1600" dirty="0" smtClean="0"/>
+              <a:t>&lt;servlet&gt;</a:t>
+            </a:r>
+          </a:p>
+          <a:p>
+            <a:pPr algn="ctr"/>
+            <a:r>
+              <a:rPr kumimoji="1" lang="en-US" altLang="ja-JP" dirty="0" err="1" smtClean="0"/>
+              <a:t>HttpSession</a:t>
+            </a:r>
+            <a:endParaRPr kumimoji="1" lang="ja-JP" altLang="en-US" sz="1200" dirty="0"/>
+          </a:p>
+        </p:txBody>
+      </p:sp>
+      <p:sp>
+        <p:nvSpPr>
+          <p:cNvPr id="74" name="角丸四角形 73"/>
+          <p:cNvSpPr/>
+          <p:nvPr/>
+        </p:nvSpPr>
+        <p:spPr>
+          <a:xfrm>
+            <a:off x="4811871" y="2638003"/>
+            <a:ext cx="2839910" cy="857130"/>
+          </a:xfrm>
+          <a:prstGeom prst="roundRect">
+            <a:avLst/>
+          </a:prstGeom>
+        </p:spPr>
+        <p:style>
+          <a:lnRef idx="1">
+            <a:schemeClr val="accent1"/>
+          </a:lnRef>
+          <a:fillRef idx="3">
+            <a:schemeClr val="accent1"/>
+          </a:fillRef>
+          <a:effectRef idx="2">
+            <a:schemeClr val="accent1"/>
+          </a:effectRef>
+          <a:fontRef idx="minor">
+            <a:schemeClr val="lt1"/>
+          </a:fontRef>
+        </p:style>
+        <p:txBody>
+          <a:bodyPr rtlCol="0" anchor="ctr" anchorCtr="1"/>
+          <a:lstStyle/>
+          <a:p>
+            <a:pPr algn="ctr"/>
+            <a:r>
+              <a:rPr lang="en-US" altLang="ja-JP" dirty="0" err="1"/>
+              <a:t>ArticleSearchCriteriaForm</a:t>
+            </a:r>
+            <a:endParaRPr lang="ja-JP" altLang="en-US" dirty="0">
+              <a:solidFill>
+                <a:prstClr val="white"/>
+              </a:solidFill>
+            </a:endParaRPr>
+          </a:p>
+        </p:txBody>
+      </p:sp>
       <p:cxnSp>
         <p:nvCxnSpPr>
           <p:cNvPr id="106" name="直線矢印コネクタ 105"/>
           <p:cNvCxnSpPr>
-            <a:stCxn id="60" idx="3"/>
+            <a:stCxn id="24" idx="3"/>
           </p:cNvCxnSpPr>
           <p:nvPr/>
         </p:nvCxnSpPr>
         <p:spPr>
-          <a:xfrm>
-            <a:off x="2958839" y="3197842"/>
-            <a:ext cx="1568628" cy="0"/>
+          <a:xfrm flipV="1">
+            <a:off x="3177472" y="3175000"/>
+            <a:ext cx="1634399" cy="666151"/>
           </a:xfrm>
           <a:prstGeom prst="straightConnector1">
             <a:avLst/>
@@ -7342,150 +7373,16 @@
           </a:fontRef>
         </p:style>
       </p:cxnSp>
-      <p:grpSp>
-        <p:nvGrpSpPr>
-          <p:cNvPr id="28" name="グループ化 27"/>
-          <p:cNvGrpSpPr/>
-          <p:nvPr/>
-        </p:nvGrpSpPr>
-        <p:grpSpPr>
-          <a:xfrm>
-            <a:off x="1020952" y="4912006"/>
-            <a:ext cx="1943880" cy="895320"/>
-            <a:chOff x="1131688" y="4876830"/>
-            <a:chExt cx="1943880" cy="895320"/>
-          </a:xfrm>
-        </p:grpSpPr>
-        <p:sp>
-          <p:nvSpPr>
-            <p:cNvPr id="84" name="正方形/長方形 83"/>
-            <p:cNvSpPr/>
-            <p:nvPr/>
-          </p:nvSpPr>
-          <p:spPr>
-            <a:xfrm>
-              <a:off x="1131688" y="4876830"/>
-              <a:ext cx="1943880" cy="895320"/>
-            </a:xfrm>
-            <a:prstGeom prst="rect">
-              <a:avLst/>
-            </a:prstGeom>
-          </p:spPr>
-          <p:style>
-            <a:lnRef idx="2">
-              <a:schemeClr val="accent1"/>
-            </a:lnRef>
-            <a:fillRef idx="1">
-              <a:schemeClr val="lt1"/>
-            </a:fillRef>
-            <a:effectRef idx="0">
-              <a:schemeClr val="accent1"/>
-            </a:effectRef>
-            <a:fontRef idx="minor">
-              <a:schemeClr val="dk1"/>
-            </a:fontRef>
-          </p:style>
-          <p:txBody>
-            <a:bodyPr rtlCol="0" anchor="t" anchorCtr="1"/>
-            <a:lstStyle/>
-            <a:p>
-              <a:pPr algn="ctr"/>
-              <a:r>
-                <a:rPr lang="en-US" altLang="ja-JP" sz="1600" dirty="0" smtClean="0">
-                  <a:solidFill>
-                    <a:prstClr val="black"/>
-                  </a:solidFill>
-                </a:rPr>
-                <a:t>Article</a:t>
-              </a:r>
-            </a:p>
-            <a:p>
-              <a:pPr algn="ctr"/>
-              <a:r>
-                <a:rPr lang="en-US" altLang="ja-JP" sz="1600" dirty="0" smtClean="0">
-                  <a:solidFill>
-                    <a:prstClr val="black"/>
-                  </a:solidFill>
-                </a:rPr>
-                <a:t>list(GET</a:t>
-              </a:r>
-              <a:r>
-                <a:rPr lang="en-US" altLang="ja-JP" sz="1600" dirty="0" smtClean="0">
-                  <a:solidFill>
-                    <a:prstClr val="black"/>
-                  </a:solidFill>
-                </a:rPr>
-                <a:t>)</a:t>
-              </a:r>
-              <a:endParaRPr lang="ja-JP" altLang="en-US" sz="1600" dirty="0">
-                <a:solidFill>
-                  <a:prstClr val="black"/>
-                </a:solidFill>
-              </a:endParaRPr>
-            </a:p>
-          </p:txBody>
-        </p:sp>
-        <p:sp>
-          <p:nvSpPr>
-            <p:cNvPr id="89" name="角丸四角形 88"/>
-            <p:cNvSpPr/>
-            <p:nvPr/>
-          </p:nvSpPr>
-          <p:spPr>
-            <a:xfrm>
-              <a:off x="1795772" y="5471878"/>
-              <a:ext cx="576063" cy="194054"/>
-            </a:xfrm>
-            <a:prstGeom prst="roundRect">
-              <a:avLst/>
-            </a:prstGeom>
-          </p:spPr>
-          <p:style>
-            <a:lnRef idx="1">
-              <a:schemeClr val="accent1"/>
-            </a:lnRef>
-            <a:fillRef idx="3">
-              <a:schemeClr val="accent1"/>
-            </a:fillRef>
-            <a:effectRef idx="2">
-              <a:schemeClr val="accent1"/>
-            </a:effectRef>
-            <a:fontRef idx="minor">
-              <a:schemeClr val="lt1"/>
-            </a:fontRef>
-          </p:style>
-          <p:txBody>
-            <a:bodyPr rtlCol="0" anchor="ctr" anchorCtr="1"/>
-            <a:lstStyle/>
-            <a:p>
-              <a:pPr algn="ctr"/>
-              <a:r>
-                <a:rPr lang="en-US" altLang="ja-JP" sz="1100" dirty="0" smtClean="0">
-                  <a:solidFill>
-                    <a:prstClr val="white"/>
-                  </a:solidFill>
-                </a:rPr>
-                <a:t>Back</a:t>
-              </a:r>
-              <a:endParaRPr lang="ja-JP" altLang="en-US" sz="1100" dirty="0">
-                <a:solidFill>
-                  <a:prstClr val="white"/>
-                </a:solidFill>
-              </a:endParaRPr>
-            </a:p>
-          </p:txBody>
-        </p:sp>
-      </p:grpSp>
-      <p:sp>
-        <p:nvSpPr>
-          <p:cNvPr id="33" name="正方形/長方形 32"/>
+      <p:sp>
+        <p:nvSpPr>
+          <p:cNvPr id="4" name="正方形/長方形 3"/>
           <p:cNvSpPr/>
           <p:nvPr/>
         </p:nvSpPr>
         <p:spPr>
           <a:xfrm>
-            <a:off x="1016621" y="743320"/>
-            <a:ext cx="1942218" cy="824449"/>
+            <a:off x="744611" y="1649242"/>
+            <a:ext cx="2432861" cy="824449"/>
           </a:xfrm>
           <a:prstGeom prst="rect">
             <a:avLst/>
@@ -7511,43 +7408,9 @@
           <a:p>
             <a:pPr algn="ctr"/>
             <a:r>
-              <a:rPr lang="en-US" altLang="ja-JP" sz="1600" dirty="0" smtClean="0">
-                <a:solidFill>
-                  <a:prstClr val="black"/>
-                </a:solidFill>
-              </a:rPr>
-              <a:t>Article Search</a:t>
-            </a:r>
-          </a:p>
-          <a:p>
-            <a:pPr algn="ctr"/>
-            <a:r>
-              <a:rPr lang="en-US" altLang="ja-JP" sz="1600" dirty="0" smtClean="0">
-                <a:solidFill>
-                  <a:prstClr val="black"/>
-                </a:solidFill>
-              </a:rPr>
-              <a:t>(1) </a:t>
-            </a:r>
-            <a:r>
-              <a:rPr lang="en-US" altLang="ja-JP" sz="1600" dirty="0" err="1" smtClean="0">
-                <a:solidFill>
-                  <a:prstClr val="black"/>
-                </a:solidFill>
-              </a:rPr>
-              <a:t>init</a:t>
-            </a:r>
-            <a:r>
-              <a:rPr lang="en-US" altLang="ja-JP" sz="1600" dirty="0" smtClean="0">
-                <a:solidFill>
-                  <a:prstClr val="black"/>
-                </a:solidFill>
-              </a:rPr>
-              <a:t>(GET)</a:t>
-            </a:r>
-          </a:p>
-          <a:p>
-            <a:pPr algn="ctr"/>
+              <a:rPr lang="en-US" altLang="ja-JP" sz="1600" dirty="0" err="1" smtClean="0"/>
+              <a:t>ArticleSearchCriteriaForm</a:t>
+            </a:r>
             <a:endParaRPr lang="ja-JP" altLang="en-US" sz="1600" dirty="0">
               <a:solidFill>
                 <a:prstClr val="black"/>
@@ -7558,66 +7421,13 @@
       </p:sp>
       <p:sp>
         <p:nvSpPr>
-          <p:cNvPr id="4" name="正方形/長方形 3"/>
-          <p:cNvSpPr/>
-          <p:nvPr/>
-        </p:nvSpPr>
-        <p:spPr>
-          <a:xfrm>
-            <a:off x="1017575" y="1907618"/>
-            <a:ext cx="1942218" cy="824449"/>
-          </a:xfrm>
-          <a:prstGeom prst="rect">
-            <a:avLst/>
-          </a:prstGeom>
-        </p:spPr>
-        <p:style>
-          <a:lnRef idx="2">
-            <a:schemeClr val="accent1"/>
-          </a:lnRef>
-          <a:fillRef idx="1">
-            <a:schemeClr val="lt1"/>
-          </a:fillRef>
-          <a:effectRef idx="0">
-            <a:schemeClr val="accent1"/>
-          </a:effectRef>
-          <a:fontRef idx="minor">
-            <a:schemeClr val="dk1"/>
-          </a:fontRef>
-        </p:style>
-        <p:txBody>
-          <a:bodyPr rtlCol="0" anchor="t" anchorCtr="1"/>
-          <a:lstStyle/>
-          <a:p>
-            <a:pPr algn="ctr"/>
-            <a:r>
-              <a:rPr lang="en-US" altLang="ja-JP" sz="1600" dirty="0" smtClean="0"/>
-              <a:t>Article Search</a:t>
-            </a:r>
-          </a:p>
-          <a:p>
-            <a:pPr algn="ctr"/>
-            <a:r>
-              <a:rPr lang="en-US" altLang="ja-JP" sz="1600" dirty="0" smtClean="0"/>
-              <a:t>(2) list(POST)</a:t>
-            </a:r>
-            <a:endParaRPr lang="ja-JP" altLang="en-US" sz="1600" dirty="0">
-              <a:solidFill>
-                <a:prstClr val="black"/>
-              </a:solidFill>
-            </a:endParaRPr>
-          </a:p>
-        </p:txBody>
-      </p:sp>
-      <p:sp>
-        <p:nvSpPr>
           <p:cNvPr id="5" name="角丸四角形 4"/>
           <p:cNvSpPr/>
           <p:nvPr/>
         </p:nvSpPr>
         <p:spPr>
           <a:xfrm>
-            <a:off x="1694562" y="2468710"/>
+            <a:off x="1673009" y="2136930"/>
             <a:ext cx="576063" cy="194054"/>
           </a:xfrm>
           <a:prstGeom prst="roundRect">
@@ -7659,239 +7469,78 @@
           </a:p>
         </p:txBody>
       </p:sp>
-      <p:grpSp>
-        <p:nvGrpSpPr>
-          <p:cNvPr id="18" name="グループ化 17"/>
-          <p:cNvGrpSpPr/>
-          <p:nvPr/>
-        </p:nvGrpSpPr>
-        <p:grpSpPr>
-          <a:xfrm>
-            <a:off x="1016621" y="2731824"/>
-            <a:ext cx="1942218" cy="1858721"/>
-            <a:chOff x="1671882" y="3022456"/>
-            <a:chExt cx="1942218" cy="1858721"/>
-          </a:xfrm>
-        </p:grpSpPr>
-        <p:sp>
-          <p:nvSpPr>
-            <p:cNvPr id="60" name="正方形/長方形 59"/>
-            <p:cNvSpPr/>
-            <p:nvPr/>
-          </p:nvSpPr>
-          <p:spPr>
-            <a:xfrm>
-              <a:off x="1671882" y="3022456"/>
-              <a:ext cx="1942218" cy="932035"/>
-            </a:xfrm>
-            <a:prstGeom prst="rect">
-              <a:avLst/>
-            </a:prstGeom>
-          </p:spPr>
-          <p:style>
-            <a:lnRef idx="2">
-              <a:schemeClr val="accent1"/>
-            </a:lnRef>
-            <a:fillRef idx="1">
-              <a:schemeClr val="lt1"/>
-            </a:fillRef>
-            <a:effectRef idx="0">
-              <a:schemeClr val="accent1"/>
-            </a:effectRef>
-            <a:fontRef idx="minor">
-              <a:schemeClr val="dk1"/>
-            </a:fontRef>
-          </p:style>
-          <p:txBody>
-            <a:bodyPr rtlCol="0" anchor="t" anchorCtr="1"/>
-            <a:lstStyle/>
-            <a:p>
-              <a:pPr algn="ctr"/>
-              <a:r>
-                <a:rPr lang="en-US" altLang="ja-JP" sz="1600" dirty="0" smtClean="0">
-                  <a:solidFill>
-                    <a:prstClr val="black"/>
-                  </a:solidFill>
-                </a:rPr>
-                <a:t>Article Search</a:t>
-              </a:r>
-            </a:p>
-            <a:p>
-              <a:pPr algn="ctr"/>
-              <a:r>
-                <a:rPr lang="en-US" altLang="ja-JP" sz="1600" dirty="0" smtClean="0">
-                  <a:solidFill>
-                    <a:prstClr val="black"/>
-                  </a:solidFill>
-                </a:rPr>
-                <a:t>(3) list(GET)</a:t>
-              </a:r>
-              <a:endParaRPr lang="ja-JP" altLang="en-US" sz="1600" dirty="0">
-                <a:solidFill>
-                  <a:prstClr val="black"/>
-                </a:solidFill>
-              </a:endParaRPr>
-            </a:p>
-          </p:txBody>
-        </p:sp>
-        <p:pic>
-          <p:nvPicPr>
-            <p:cNvPr id="32" name="Picture 2"/>
-            <p:cNvPicPr>
-              <a:picLocks noChangeAspect="1" noChangeArrowheads="1"/>
-            </p:cNvPicPr>
-            <p:nvPr/>
-          </p:nvPicPr>
-          <p:blipFill>
-            <a:blip r:embed="rId2">
-              <a:extLst>
-                <a:ext uri="{28A0092B-C50C-407E-A947-70E740481C1C}">
-                  <a14:useLocalDpi xmlns:a14="http://schemas.microsoft.com/office/drawing/2010/main" val="0"/>
-                </a:ext>
-              </a:extLst>
-            </a:blip>
-            <a:srcRect/>
-            <a:stretch>
-              <a:fillRect/>
-            </a:stretch>
-          </p:blipFill>
-          <p:spPr bwMode="auto">
-            <a:xfrm>
-              <a:off x="1960231" y="3572556"/>
-              <a:ext cx="1492891" cy="330895"/>
-            </a:xfrm>
-            <a:prstGeom prst="rect">
-              <a:avLst/>
-            </a:prstGeom>
-            <a:noFill/>
-            <a:ln>
-              <a:noFill/>
-            </a:ln>
+      <p:pic>
+        <p:nvPicPr>
+          <p:cNvPr id="32" name="Picture 2"/>
+          <p:cNvPicPr>
+            <a:picLocks noChangeAspect="1" noChangeArrowheads="1"/>
+          </p:cNvPicPr>
+          <p:nvPr/>
+        </p:nvPicPr>
+        <p:blipFill>
+          <a:blip r:embed="rId2">
             <a:extLst>
-              <a:ext uri="{909E8E84-426E-40DD-AFC4-6F175D3DCCD1}">
-                <a14:hiddenFill xmlns:a14="http://schemas.microsoft.com/office/drawing/2010/main">
-                  <a:solidFill>
-                    <a:schemeClr val="accent1"/>
-                  </a:solidFill>
-                </a14:hiddenFill>
-              </a:ext>
-              <a:ext uri="{91240B29-F687-4F45-9708-019B960494DF}">
-                <a14:hiddenLine xmlns:a14="http://schemas.microsoft.com/office/drawing/2010/main" w="9525">
-                  <a:solidFill>
-                    <a:schemeClr val="tx1"/>
-                  </a:solidFill>
-                  <a:miter lim="800000"/>
-                  <a:headEnd/>
-                  <a:tailEnd/>
-                </a14:hiddenLine>
+              <a:ext uri="{28A0092B-C50C-407E-A947-70E740481C1C}">
+                <a14:useLocalDpi xmlns:a14="http://schemas.microsoft.com/office/drawing/2010/main" val="0"/>
               </a:ext>
             </a:extLst>
-          </p:spPr>
-        </p:pic>
-        <p:sp>
-          <p:nvSpPr>
-            <p:cNvPr id="26" name="正方形/長方形 25"/>
-            <p:cNvSpPr/>
-            <p:nvPr/>
-          </p:nvSpPr>
-          <p:spPr>
-            <a:xfrm>
-              <a:off x="1671882" y="3949142"/>
-              <a:ext cx="1942218" cy="932035"/>
-            </a:xfrm>
-            <a:prstGeom prst="rect">
-              <a:avLst/>
-            </a:prstGeom>
-          </p:spPr>
-          <p:style>
-            <a:lnRef idx="2">
-              <a:schemeClr val="accent1"/>
-            </a:lnRef>
-            <a:fillRef idx="1">
-              <a:schemeClr val="lt1"/>
-            </a:fillRef>
-            <a:effectRef idx="0">
-              <a:schemeClr val="accent1"/>
-            </a:effectRef>
-            <a:fontRef idx="minor">
-              <a:schemeClr val="dk1"/>
-            </a:fontRef>
-          </p:style>
-          <p:txBody>
-            <a:bodyPr rtlCol="0" anchor="t" anchorCtr="1"/>
-            <a:lstStyle/>
-            <a:p>
-              <a:pPr algn="ctr"/>
-              <a:r>
-                <a:rPr lang="en-US" altLang="ja-JP" sz="1600" dirty="0" smtClean="0">
-                  <a:solidFill>
-                    <a:prstClr val="black"/>
-                  </a:solidFill>
-                </a:rPr>
-                <a:t>Article Search</a:t>
-              </a:r>
-            </a:p>
-            <a:p>
-              <a:pPr algn="ctr"/>
-              <a:r>
-                <a:rPr lang="en-US" altLang="ja-JP" sz="1600" dirty="0" smtClean="0">
-                  <a:solidFill>
-                    <a:prstClr val="black"/>
-                  </a:solidFill>
-                </a:rPr>
-                <a:t>(4) detail(GET)</a:t>
-              </a:r>
-              <a:endParaRPr lang="ja-JP" altLang="en-US" sz="1600" dirty="0">
+          </a:blip>
+          <a:srcRect/>
+          <a:stretch>
+            <a:fillRect/>
+          </a:stretch>
+        </p:blipFill>
+        <p:spPr bwMode="auto">
+          <a:xfrm>
+            <a:off x="1249043" y="3827325"/>
+            <a:ext cx="1492891" cy="330895"/>
+          </a:xfrm>
+          <a:prstGeom prst="rect">
+            <a:avLst/>
+          </a:prstGeom>
+          <a:noFill/>
+          <a:ln>
+            <a:noFill/>
+          </a:ln>
+          <a:extLst>
+            <a:ext uri="{909E8E84-426E-40DD-AFC4-6F175D3DCCD1}">
+              <a14:hiddenFill xmlns:a14="http://schemas.microsoft.com/office/drawing/2010/main">
                 <a:solidFill>
-                  <a:prstClr val="black"/>
+                  <a:schemeClr val="accent1"/>
                 </a:solidFill>
-              </a:endParaRPr>
-            </a:p>
-          </p:txBody>
-        </p:sp>
-        <p:pic>
-          <p:nvPicPr>
-            <p:cNvPr id="12" name="図 11"/>
-            <p:cNvPicPr>
-              <a:picLocks noChangeAspect="1"/>
-            </p:cNvPicPr>
-            <p:nvPr/>
-          </p:nvPicPr>
-          <p:blipFill>
-            <a:blip r:embed="rId3"/>
-            <a:stretch>
-              <a:fillRect/>
-            </a:stretch>
-          </p:blipFill>
-          <p:spPr>
-            <a:xfrm>
-              <a:off x="1893086" y="4532176"/>
-              <a:ext cx="1504050" cy="231879"/>
-            </a:xfrm>
-            <a:prstGeom prst="rect">
-              <a:avLst/>
-            </a:prstGeom>
-          </p:spPr>
-        </p:pic>
-      </p:grpSp>
+              </a14:hiddenFill>
+            </a:ext>
+            <a:ext uri="{91240B29-F687-4F45-9708-019B960494DF}">
+              <a14:hiddenLine xmlns:a14="http://schemas.microsoft.com/office/drawing/2010/main" w="9525">
+                <a:solidFill>
+                  <a:schemeClr val="tx1"/>
+                </a:solidFill>
+                <a:miter lim="800000"/>
+                <a:headEnd/>
+                <a:tailEnd/>
+              </a14:hiddenLine>
+            </a:ext>
+          </a:extLst>
+        </p:spPr>
+      </p:pic>
       <p:cxnSp>
         <p:nvCxnSpPr>
-          <p:cNvPr id="38" name="直線矢印コネクタ 37"/>
+          <p:cNvPr id="58" name="直線矢印コネクタ 57"/>
           <p:cNvCxnSpPr>
-            <a:stCxn id="33" idx="2"/>
-            <a:endCxn id="4" idx="0"/>
+            <a:stCxn id="4" idx="3"/>
           </p:cNvCxnSpPr>
           <p:nvPr/>
         </p:nvCxnSpPr>
         <p:spPr>
           <a:xfrm>
-            <a:off x="1987730" y="1567769"/>
-            <a:ext cx="954" cy="339849"/>
+            <a:off x="3177472" y="2061467"/>
+            <a:ext cx="1634399" cy="975836"/>
           </a:xfrm>
           <a:prstGeom prst="straightConnector1">
             <a:avLst/>
           </a:prstGeom>
-          <a:ln>
+          <a:ln w="9525">
+            <a:prstDash val="dash"/>
             <a:headEnd type="none"/>
             <a:tailEnd type="arrow"/>
           </a:ln>
@@ -7913,25 +7562,23 @@
       </p:cxnSp>
       <p:cxnSp>
         <p:nvCxnSpPr>
-          <p:cNvPr id="36" name="カギ線コネクタ 35"/>
+          <p:cNvPr id="20" name="直線矢印コネクタ 19"/>
           <p:cNvCxnSpPr>
-            <a:stCxn id="89" idx="1"/>
-            <a:endCxn id="60" idx="1"/>
+            <a:stCxn id="4" idx="2"/>
+            <a:endCxn id="24" idx="0"/>
           </p:cNvCxnSpPr>
           <p:nvPr/>
         </p:nvCxnSpPr>
         <p:spPr>
-          <a:xfrm rot="10800000">
-            <a:off x="1016622" y="3197843"/>
-            <a:ext cx="668415" cy="2406239"/>
-          </a:xfrm>
-          <a:prstGeom prst="bentConnector3">
-            <a:avLst>
-              <a:gd name="adj1" fmla="val 134200"/>
-            </a:avLst>
+          <a:xfrm>
+            <a:off x="1961042" y="2473691"/>
+            <a:ext cx="0" cy="941410"/>
+          </a:xfrm>
+          <a:prstGeom prst="straightConnector1">
+            <a:avLst/>
           </a:prstGeom>
           <a:ln>
-            <a:headEnd type="none"/>
+            <a:headEnd type="arrow"/>
             <a:tailEnd type="arrow"/>
           </a:ln>
         </p:spPr>
@@ -7950,116 +7597,125 @@
           </a:fontRef>
         </p:style>
       </p:cxnSp>
-      <p:cxnSp>
-        <p:nvCxnSpPr>
-          <p:cNvPr id="42" name="直線矢印コネクタ 41"/>
-          <p:cNvCxnSpPr>
-            <a:stCxn id="12" idx="2"/>
-            <a:endCxn id="84" idx="0"/>
-          </p:cNvCxnSpPr>
-          <p:nvPr/>
-        </p:nvCxnSpPr>
-        <p:spPr>
-          <a:xfrm>
-            <a:off x="1989850" y="4473423"/>
-            <a:ext cx="3042" cy="438583"/>
-          </a:xfrm>
-          <a:prstGeom prst="straightConnector1">
-            <a:avLst/>
-          </a:prstGeom>
-          <a:ln>
-            <a:tailEnd type="arrow"/>
+      <p:sp>
+        <p:nvSpPr>
+          <p:cNvPr id="29" name="環状矢印 28"/>
+          <p:cNvSpPr/>
+          <p:nvPr/>
+        </p:nvSpPr>
+        <p:spPr>
+          <a:xfrm rot="14243874" flipH="1">
+            <a:off x="393319" y="2986595"/>
+            <a:ext cx="847122" cy="864325"/>
+          </a:xfrm>
+          <a:prstGeom prst="circularArrow">
+            <a:avLst>
+              <a:gd name="adj1" fmla="val 0"/>
+              <a:gd name="adj2" fmla="val 1596054"/>
+              <a:gd name="adj3" fmla="val 17935374"/>
+              <a:gd name="adj4" fmla="val 2845999"/>
+              <a:gd name="adj5" fmla="val 18659"/>
+            </a:avLst>
+          </a:prstGeom>
+          <a:solidFill>
+            <a:schemeClr val="tx2">
+              <a:lumMod val="40000"/>
+              <a:lumOff val="60000"/>
+            </a:schemeClr>
+          </a:solidFill>
+          <a:ln w="41275">
+            <a:solidFill>
+              <a:schemeClr val="accent1"/>
+            </a:solidFill>
           </a:ln>
         </p:spPr>
         <p:style>
-          <a:lnRef idx="2">
+          <a:lnRef idx="1">
             <a:schemeClr val="accent1"/>
           </a:lnRef>
-          <a:fillRef idx="0">
+          <a:fillRef idx="3">
             <a:schemeClr val="accent1"/>
           </a:fillRef>
-          <a:effectRef idx="1">
+          <a:effectRef idx="2">
             <a:schemeClr val="accent1"/>
           </a:effectRef>
           <a:fontRef idx="minor">
-            <a:schemeClr val="tx1"/>
+            <a:schemeClr val="lt1"/>
           </a:fontRef>
         </p:style>
-      </p:cxnSp>
-      <p:cxnSp>
-        <p:nvCxnSpPr>
-          <p:cNvPr id="55" name="直線矢印コネクタ 54"/>
-          <p:cNvCxnSpPr>
-            <a:stCxn id="4" idx="3"/>
-          </p:cNvCxnSpPr>
-          <p:nvPr/>
-        </p:nvCxnSpPr>
-        <p:spPr>
-          <a:xfrm>
-            <a:off x="2959793" y="2319843"/>
-            <a:ext cx="1574817" cy="714213"/>
-          </a:xfrm>
-          <a:prstGeom prst="straightConnector1">
-            <a:avLst/>
-          </a:prstGeom>
-          <a:ln w="9525">
-            <a:prstDash val="dash"/>
-            <a:headEnd type="none"/>
-            <a:tailEnd type="arrow"/>
-          </a:ln>
-        </p:spPr>
-        <p:style>
-          <a:lnRef idx="2">
-            <a:schemeClr val="accent1"/>
-          </a:lnRef>
-          <a:fillRef idx="0">
-            <a:schemeClr val="accent1"/>
-          </a:fillRef>
-          <a:effectRef idx="1">
-            <a:schemeClr val="accent1"/>
-          </a:effectRef>
-          <a:fontRef idx="minor">
-            <a:schemeClr val="tx1"/>
-          </a:fontRef>
-        </p:style>
-      </p:cxnSp>
-      <p:cxnSp>
-        <p:nvCxnSpPr>
-          <p:cNvPr id="58" name="直線矢印コネクタ 57"/>
-          <p:cNvCxnSpPr>
-            <a:stCxn id="33" idx="3"/>
-          </p:cNvCxnSpPr>
-          <p:nvPr/>
-        </p:nvCxnSpPr>
-        <p:spPr>
-          <a:xfrm>
-            <a:off x="2958839" y="1155545"/>
-            <a:ext cx="1578153" cy="1672090"/>
-          </a:xfrm>
-          <a:prstGeom prst="straightConnector1">
-            <a:avLst/>
-          </a:prstGeom>
-          <a:ln w="9525">
-            <a:prstDash val="dash"/>
-            <a:headEnd type="none"/>
-            <a:tailEnd type="arrow"/>
-          </a:ln>
-        </p:spPr>
-        <p:style>
-          <a:lnRef idx="2">
-            <a:schemeClr val="accent1"/>
-          </a:lnRef>
-          <a:fillRef idx="0">
-            <a:schemeClr val="accent1"/>
-          </a:fillRef>
-          <a:effectRef idx="1">
-            <a:schemeClr val="accent1"/>
-          </a:effectRef>
-          <a:fontRef idx="minor">
-            <a:schemeClr val="tx1"/>
-          </a:fontRef>
-        </p:style>
-      </p:cxnSp>
+        <p:txBody>
+          <a:bodyPr rtlCol="0" anchor="ctr"/>
+          <a:lstStyle/>
+          <a:p>
+            <a:pPr algn="ctr"/>
+            <a:endParaRPr kumimoji="1" lang="ja-JP" altLang="en-US">
+              <a:solidFill>
+                <a:schemeClr val="tx1"/>
+              </a:solidFill>
+            </a:endParaRPr>
+          </a:p>
+        </p:txBody>
+      </p:sp>
+      <p:sp>
+        <p:nvSpPr>
+          <p:cNvPr id="47" name="テキスト ボックス 46"/>
+          <p:cNvSpPr txBox="1"/>
+          <p:nvPr/>
+        </p:nvSpPr>
+        <p:spPr>
+          <a:xfrm>
+            <a:off x="1119118" y="2008163"/>
+            <a:ext cx="442750" cy="369332"/>
+          </a:xfrm>
+          <a:prstGeom prst="rect">
+            <a:avLst/>
+          </a:prstGeom>
+          <a:noFill/>
+        </p:spPr>
+        <p:txBody>
+          <a:bodyPr wrap="none" rtlCol="0">
+            <a:spAutoFit/>
+          </a:bodyPr>
+          <a:lstStyle/>
+          <a:p>
+            <a:r>
+              <a:rPr kumimoji="1" lang="en-US" altLang="ja-JP" dirty="0" smtClean="0"/>
+              <a:t>(1)</a:t>
+            </a:r>
+            <a:endParaRPr kumimoji="1" lang="ja-JP" altLang="en-US" dirty="0"/>
+          </a:p>
+        </p:txBody>
+      </p:sp>
+      <p:sp>
+        <p:nvSpPr>
+          <p:cNvPr id="48" name="テキスト ボックス 47"/>
+          <p:cNvSpPr txBox="1"/>
+          <p:nvPr/>
+        </p:nvSpPr>
+        <p:spPr>
+          <a:xfrm>
+            <a:off x="806293" y="3808106"/>
+            <a:ext cx="442750" cy="369332"/>
+          </a:xfrm>
+          <a:prstGeom prst="rect">
+            <a:avLst/>
+          </a:prstGeom>
+          <a:noFill/>
+        </p:spPr>
+        <p:txBody>
+          <a:bodyPr wrap="none" rtlCol="0">
+            <a:spAutoFit/>
+          </a:bodyPr>
+          <a:lstStyle/>
+          <a:p>
+            <a:r>
+              <a:rPr kumimoji="1" lang="en-US" altLang="ja-JP" dirty="0" smtClean="0"/>
+              <a:t>(2)</a:t>
+            </a:r>
+            <a:endParaRPr kumimoji="1" lang="ja-JP" altLang="en-US" dirty="0"/>
+          </a:p>
+        </p:txBody>
+      </p:sp>
     </p:spTree>
     <p:extLst>
       <p:ext uri="{BB962C8B-B14F-4D97-AF65-F5344CB8AC3E}">

</xml_diff>

<commit_message>
Modify session pageination description.#1240
</commit_message>
<xml_diff>
--- a/source/ArchitectureInDetail/WebApplicationDetail/images_Pagination/materialPagination.pptx
+++ b/source/ArchitectureInDetail/WebApplicationDetail/images_Pagination/materialPagination.pptx
@@ -254,7 +254,7 @@
             <a:fld id="{3BB47352-BF5A-4CD2-B029-996118CD8E01}" type="datetimeFigureOut">
               <a:rPr kumimoji="1" lang="ja-JP" altLang="en-US" smtClean="0"/>
               <a:pPr/>
-              <a:t>2016/11/2</a:t>
+              <a:t>2016/11/7</a:t>
             </a:fld>
             <a:endParaRPr kumimoji="1" lang="ja-JP" altLang="en-US"/>
           </a:p>
@@ -737,7 +737,7 @@
             <a:fld id="{7B9B12EC-6AA0-374B-A2D3-850081A07A26}" type="datetimeFigureOut">
               <a:rPr kumimoji="1" lang="ja-JP" altLang="en-US" smtClean="0"/>
               <a:pPr/>
-              <a:t>2016/11/2</a:t>
+              <a:t>2016/11/7</a:t>
             </a:fld>
             <a:endParaRPr kumimoji="1" lang="ja-JP" altLang="en-US"/>
           </a:p>
@@ -941,7 +941,7 @@
             <a:fld id="{7B9B12EC-6AA0-374B-A2D3-850081A07A26}" type="datetimeFigureOut">
               <a:rPr kumimoji="1" lang="ja-JP" altLang="en-US" smtClean="0"/>
               <a:pPr/>
-              <a:t>2016/11/2</a:t>
+              <a:t>2016/11/7</a:t>
             </a:fld>
             <a:endParaRPr kumimoji="1" lang="ja-JP" altLang="en-US"/>
           </a:p>
@@ -1155,7 +1155,7 @@
             <a:fld id="{7B9B12EC-6AA0-374B-A2D3-850081A07A26}" type="datetimeFigureOut">
               <a:rPr kumimoji="1" lang="ja-JP" altLang="en-US" smtClean="0"/>
               <a:pPr/>
-              <a:t>2016/11/2</a:t>
+              <a:t>2016/11/7</a:t>
             </a:fld>
             <a:endParaRPr kumimoji="1" lang="ja-JP" altLang="en-US"/>
           </a:p>
@@ -1359,7 +1359,7 @@
             <a:fld id="{7B9B12EC-6AA0-374B-A2D3-850081A07A26}" type="datetimeFigureOut">
               <a:rPr kumimoji="1" lang="ja-JP" altLang="en-US" smtClean="0"/>
               <a:pPr/>
-              <a:t>2016/11/2</a:t>
+              <a:t>2016/11/7</a:t>
             </a:fld>
             <a:endParaRPr kumimoji="1" lang="ja-JP" altLang="en-US"/>
           </a:p>
@@ -1607,7 +1607,7 @@
             <a:fld id="{7B9B12EC-6AA0-374B-A2D3-850081A07A26}" type="datetimeFigureOut">
               <a:rPr kumimoji="1" lang="ja-JP" altLang="en-US" smtClean="0"/>
               <a:pPr/>
-              <a:t>2016/11/2</a:t>
+              <a:t>2016/11/7</a:t>
             </a:fld>
             <a:endParaRPr kumimoji="1" lang="ja-JP" altLang="en-US"/>
           </a:p>
@@ -1961,7 +1961,7 @@
             <a:fld id="{7B9B12EC-6AA0-374B-A2D3-850081A07A26}" type="datetimeFigureOut">
               <a:rPr kumimoji="1" lang="ja-JP" altLang="en-US" smtClean="0"/>
               <a:pPr/>
-              <a:t>2016/11/2</a:t>
+              <a:t>2016/11/7</a:t>
             </a:fld>
             <a:endParaRPr kumimoji="1" lang="ja-JP" altLang="en-US"/>
           </a:p>
@@ -2449,7 +2449,7 @@
             <a:fld id="{7B9B12EC-6AA0-374B-A2D3-850081A07A26}" type="datetimeFigureOut">
               <a:rPr kumimoji="1" lang="ja-JP" altLang="en-US" smtClean="0"/>
               <a:pPr/>
-              <a:t>2016/11/2</a:t>
+              <a:t>2016/11/7</a:t>
             </a:fld>
             <a:endParaRPr kumimoji="1" lang="ja-JP" altLang="en-US"/>
           </a:p>
@@ -2569,7 +2569,7 @@
             <a:fld id="{7B9B12EC-6AA0-374B-A2D3-850081A07A26}" type="datetimeFigureOut">
               <a:rPr kumimoji="1" lang="ja-JP" altLang="en-US" smtClean="0"/>
               <a:pPr/>
-              <a:t>2016/11/2</a:t>
+              <a:t>2016/11/7</a:t>
             </a:fld>
             <a:endParaRPr kumimoji="1" lang="ja-JP" altLang="en-US"/>
           </a:p>
@@ -2666,7 +2666,7 @@
             <a:fld id="{7B9B12EC-6AA0-374B-A2D3-850081A07A26}" type="datetimeFigureOut">
               <a:rPr kumimoji="1" lang="ja-JP" altLang="en-US" smtClean="0"/>
               <a:pPr/>
-              <a:t>2016/11/2</a:t>
+              <a:t>2016/11/7</a:t>
             </a:fld>
             <a:endParaRPr kumimoji="1" lang="ja-JP" altLang="en-US"/>
           </a:p>
@@ -2977,7 +2977,7 @@
             <a:fld id="{7B9B12EC-6AA0-374B-A2D3-850081A07A26}" type="datetimeFigureOut">
               <a:rPr kumimoji="1" lang="ja-JP" altLang="en-US" smtClean="0"/>
               <a:pPr/>
-              <a:t>2016/11/2</a:t>
+              <a:t>2016/11/7</a:t>
             </a:fld>
             <a:endParaRPr kumimoji="1" lang="ja-JP" altLang="en-US"/>
           </a:p>
@@ -3232,7 +3232,7 @@
             <a:fld id="{7B9B12EC-6AA0-374B-A2D3-850081A07A26}" type="datetimeFigureOut">
               <a:rPr kumimoji="1" lang="ja-JP" altLang="en-US" smtClean="0"/>
               <a:pPr/>
-              <a:t>2016/11/2</a:t>
+              <a:t>2016/11/7</a:t>
             </a:fld>
             <a:endParaRPr kumimoji="1" lang="ja-JP" altLang="en-US"/>
           </a:p>
@@ -3479,7 +3479,7 @@
             <a:fld id="{7B9B12EC-6AA0-374B-A2D3-850081A07A26}" type="datetimeFigureOut">
               <a:rPr kumimoji="1" lang="ja-JP" altLang="en-US" smtClean="0"/>
               <a:pPr/>
-              <a:t>2016/11/2</a:t>
+              <a:t>2016/11/7</a:t>
             </a:fld>
             <a:endParaRPr kumimoji="1" lang="ja-JP" altLang="en-US"/>
           </a:p>
@@ -7696,56 +7696,26 @@
       </p:grpSpPr>
       <p:pic>
         <p:nvPicPr>
-          <p:cNvPr id="4098" name="Picture 2"/>
+          <p:cNvPr id="2" name="図 1"/>
           <p:cNvPicPr>
-            <a:picLocks noChangeAspect="1" noChangeArrowheads="1"/>
+            <a:picLocks noChangeAspect="1"/>
           </p:cNvPicPr>
           <p:nvPr/>
         </p:nvPicPr>
         <p:blipFill>
-          <a:blip r:embed="rId2">
-            <a:extLst>
-              <a:ext uri="{28A0092B-C50C-407E-A947-70E740481C1C}">
-                <a14:useLocalDpi xmlns:a14="http://schemas.microsoft.com/office/drawing/2010/main" val="0"/>
-              </a:ext>
-            </a:extLst>
-          </a:blip>
-          <a:srcRect/>
+          <a:blip r:embed="rId2"/>
           <a:stretch>
             <a:fillRect/>
           </a:stretch>
         </p:blipFill>
-        <p:spPr bwMode="auto">
-          <a:xfrm>
-            <a:off x="1218520" y="1806121"/>
-            <a:ext cx="6924675" cy="1866900"/>
+        <p:spPr>
+          <a:xfrm>
+            <a:off x="1222552" y="1812924"/>
+            <a:ext cx="6924675" cy="1200150"/>
           </a:xfrm>
           <a:prstGeom prst="rect">
             <a:avLst/>
           </a:prstGeom>
-          <a:noFill/>
-          <a:ln>
-            <a:noFill/>
-          </a:ln>
-          <a:extLst>
-            <a:ext uri="{909E8E84-426E-40DD-AFC4-6F175D3DCCD1}">
-              <a14:hiddenFill xmlns:a14="http://schemas.microsoft.com/office/drawing/2010/main">
-                <a:solidFill>
-                  <a:schemeClr val="accent1"/>
-                </a:solidFill>
-              </a14:hiddenFill>
-            </a:ext>
-            <a:ext uri="{91240B29-F687-4F45-9708-019B960494DF}">
-              <a14:hiddenLine xmlns:a14="http://schemas.microsoft.com/office/drawing/2010/main" w="9525">
-                <a:solidFill>
-                  <a:schemeClr val="tx1"/>
-                </a:solidFill>
-                <a:miter lim="800000"/>
-                <a:headEnd/>
-                <a:tailEnd/>
-              </a14:hiddenLine>
-            </a:ext>
-          </a:extLst>
         </p:spPr>
       </p:pic>
       <p:sp>
@@ -7836,69 +7806,15 @@
           </a:p>
         </p:txBody>
       </p:sp>
-      <p:pic>
-        <p:nvPicPr>
-          <p:cNvPr id="5" name="Picture 2"/>
-          <p:cNvPicPr>
-            <a:picLocks noChangeAspect="1" noChangeArrowheads="1"/>
-          </p:cNvPicPr>
-          <p:nvPr/>
-        </p:nvPicPr>
-        <p:blipFill>
-          <a:blip r:embed="rId3">
-            <a:extLst>
-              <a:ext uri="{28A0092B-C50C-407E-A947-70E740481C1C}">
-                <a14:useLocalDpi xmlns:a14="http://schemas.microsoft.com/office/drawing/2010/main" val="0"/>
-              </a:ext>
-            </a:extLst>
-          </a:blip>
-          <a:srcRect/>
-          <a:stretch>
-            <a:fillRect/>
-          </a:stretch>
-        </p:blipFill>
-        <p:spPr bwMode="auto">
-          <a:xfrm>
-            <a:off x="2019300" y="4449582"/>
-            <a:ext cx="5105400" cy="781050"/>
-          </a:xfrm>
-          <a:prstGeom prst="rect">
-            <a:avLst/>
-          </a:prstGeom>
-          <a:noFill/>
-          <a:ln>
-            <a:noFill/>
-          </a:ln>
-          <a:extLst>
-            <a:ext uri="{909E8E84-426E-40DD-AFC4-6F175D3DCCD1}">
-              <a14:hiddenFill xmlns:a14="http://schemas.microsoft.com/office/drawing/2010/main">
-                <a:solidFill>
-                  <a:schemeClr val="accent1"/>
-                </a:solidFill>
-              </a14:hiddenFill>
-            </a:ext>
-            <a:ext uri="{91240B29-F687-4F45-9708-019B960494DF}">
-              <a14:hiddenLine xmlns:a14="http://schemas.microsoft.com/office/drawing/2010/main" w="9525">
-                <a:solidFill>
-                  <a:schemeClr val="tx1"/>
-                </a:solidFill>
-                <a:miter lim="800000"/>
-                <a:headEnd/>
-                <a:tailEnd/>
-              </a14:hiddenLine>
-            </a:ext>
-          </a:extLst>
-        </p:spPr>
-      </p:pic>
-      <p:sp>
-        <p:nvSpPr>
-          <p:cNvPr id="13" name="テキスト ボックス 12"/>
+      <p:sp>
+        <p:nvSpPr>
+          <p:cNvPr id="17" name="テキスト ボックス 16"/>
           <p:cNvSpPr txBox="1"/>
           <p:nvPr/>
         </p:nvSpPr>
         <p:spPr>
           <a:xfrm>
-            <a:off x="817202" y="3583767"/>
+            <a:off x="1603359" y="2377495"/>
             <a:ext cx="442750" cy="369332"/>
           </a:xfrm>
           <a:prstGeom prst="rect">
@@ -7914,7 +7830,7 @@
           <a:p>
             <a:r>
               <a:rPr kumimoji="1" lang="en-US" altLang="ja-JP" dirty="0" smtClean="0"/>
-              <a:t>(3)</a:t>
+              <a:t>(1)</a:t>
             </a:r>
             <a:endParaRPr kumimoji="1" lang="ja-JP" altLang="en-US" dirty="0"/>
           </a:p>
@@ -7922,57 +7838,13 @@
       </p:sp>
       <p:sp>
         <p:nvSpPr>
-          <p:cNvPr id="15" name="角丸四角形 14"/>
-          <p:cNvSpPr/>
-          <p:nvPr/>
-        </p:nvSpPr>
-        <p:spPr>
-          <a:xfrm>
-            <a:off x="2946400" y="4662308"/>
-            <a:ext cx="259645" cy="276574"/>
-          </a:xfrm>
-          <a:prstGeom prst="roundRect">
-            <a:avLst/>
-          </a:prstGeom>
-          <a:noFill/>
-          <a:ln w="19050">
-            <a:solidFill>
-              <a:srgbClr val="FF0000"/>
-            </a:solidFill>
-          </a:ln>
-        </p:spPr>
-        <p:style>
-          <a:lnRef idx="1">
-            <a:schemeClr val="accent1"/>
-          </a:lnRef>
-          <a:fillRef idx="3">
-            <a:schemeClr val="accent1"/>
-          </a:fillRef>
-          <a:effectRef idx="2">
-            <a:schemeClr val="accent1"/>
-          </a:effectRef>
-          <a:fontRef idx="minor">
-            <a:schemeClr val="lt1"/>
-          </a:fontRef>
-        </p:style>
-        <p:txBody>
-          <a:bodyPr rtlCol="0" anchor="ctr"/>
-          <a:lstStyle/>
-          <a:p>
-            <a:pPr algn="ctr"/>
-            <a:endParaRPr kumimoji="1" lang="ja-JP" altLang="en-US"/>
-          </a:p>
-        </p:txBody>
-      </p:sp>
-      <p:sp>
-        <p:nvSpPr>
-          <p:cNvPr id="17" name="テキスト ボックス 16"/>
+          <p:cNvPr id="18" name="テキスト ボックス 17"/>
           <p:cNvSpPr txBox="1"/>
           <p:nvPr/>
         </p:nvSpPr>
         <p:spPr>
           <a:xfrm>
-            <a:off x="1603359" y="2377495"/>
+            <a:off x="6193968" y="2055737"/>
             <a:ext cx="442750" cy="369332"/>
           </a:xfrm>
           <a:prstGeom prst="rect">
@@ -7987,152 +7859,10 @@
           <a:lstStyle/>
           <a:p>
             <a:r>
-              <a:rPr kumimoji="1" lang="en-US" altLang="ja-JP" dirty="0" smtClean="0"/>
-              <a:t>(4)</a:t>
+              <a:rPr kumimoji="1" lang="en-US" altLang="ja-JP" smtClean="0"/>
+              <a:t>(2)</a:t>
             </a:r>
             <a:endParaRPr kumimoji="1" lang="ja-JP" altLang="en-US" dirty="0"/>
-          </a:p>
-        </p:txBody>
-      </p:sp>
-      <p:sp>
-        <p:nvSpPr>
-          <p:cNvPr id="18" name="テキスト ボックス 17"/>
-          <p:cNvSpPr txBox="1"/>
-          <p:nvPr/>
-        </p:nvSpPr>
-        <p:spPr>
-          <a:xfrm>
-            <a:off x="6193968" y="2055737"/>
-            <a:ext cx="442750" cy="369332"/>
-          </a:xfrm>
-          <a:prstGeom prst="rect">
-            <a:avLst/>
-          </a:prstGeom>
-          <a:noFill/>
-        </p:spPr>
-        <p:txBody>
-          <a:bodyPr wrap="none" rtlCol="0">
-            <a:spAutoFit/>
-          </a:bodyPr>
-          <a:lstStyle/>
-          <a:p>
-            <a:r>
-              <a:rPr kumimoji="1" lang="en-US" altLang="ja-JP" dirty="0" smtClean="0"/>
-              <a:t>(5)</a:t>
-            </a:r>
-            <a:endParaRPr kumimoji="1" lang="ja-JP" altLang="en-US" dirty="0"/>
-          </a:p>
-        </p:txBody>
-      </p:sp>
-      <p:sp>
-        <p:nvSpPr>
-          <p:cNvPr id="19" name="テキスト ボックス 18"/>
-          <p:cNvSpPr txBox="1"/>
-          <p:nvPr/>
-        </p:nvSpPr>
-        <p:spPr>
-          <a:xfrm>
-            <a:off x="2866136" y="4939441"/>
-            <a:ext cx="442750" cy="369332"/>
-          </a:xfrm>
-          <a:prstGeom prst="rect">
-            <a:avLst/>
-          </a:prstGeom>
-          <a:noFill/>
-        </p:spPr>
-        <p:txBody>
-          <a:bodyPr wrap="none" rtlCol="0">
-            <a:spAutoFit/>
-          </a:bodyPr>
-          <a:lstStyle/>
-          <a:p>
-            <a:r>
-              <a:rPr kumimoji="1" lang="en-US" altLang="ja-JP" dirty="0" smtClean="0"/>
-              <a:t>(2)</a:t>
-            </a:r>
-            <a:endParaRPr kumimoji="1" lang="ja-JP" altLang="en-US" dirty="0"/>
-          </a:p>
-        </p:txBody>
-      </p:sp>
-      <p:sp>
-        <p:nvSpPr>
-          <p:cNvPr id="3" name="左中かっこ 2"/>
-          <p:cNvSpPr/>
-          <p:nvPr/>
-        </p:nvSpPr>
-        <p:spPr>
-          <a:xfrm>
-            <a:off x="1188096" y="3488267"/>
-            <a:ext cx="255242" cy="573034"/>
-          </a:xfrm>
-          <a:prstGeom prst="leftBrace">
-            <a:avLst/>
-          </a:prstGeom>
-        </p:spPr>
-        <p:style>
-          <a:lnRef idx="2">
-            <a:schemeClr val="accent1"/>
-          </a:lnRef>
-          <a:fillRef idx="0">
-            <a:schemeClr val="accent1"/>
-          </a:fillRef>
-          <a:effectRef idx="1">
-            <a:schemeClr val="accent1"/>
-          </a:effectRef>
-          <a:fontRef idx="minor">
-            <a:schemeClr val="tx1"/>
-          </a:fontRef>
-        </p:style>
-        <p:txBody>
-          <a:bodyPr rtlCol="0" anchor="ctr"/>
-          <a:lstStyle/>
-          <a:p>
-            <a:pPr algn="ctr"/>
-            <a:endParaRPr kumimoji="1" lang="ja-JP" altLang="en-US"/>
-          </a:p>
-        </p:txBody>
-      </p:sp>
-      <p:sp>
-        <p:nvSpPr>
-          <p:cNvPr id="21" name="角丸四角形 20"/>
-          <p:cNvSpPr/>
-          <p:nvPr/>
-        </p:nvSpPr>
-        <p:spPr>
-          <a:xfrm>
-            <a:off x="1477205" y="3412639"/>
-            <a:ext cx="6458884" cy="779018"/>
-          </a:xfrm>
-          <a:prstGeom prst="roundRect">
-            <a:avLst/>
-          </a:prstGeom>
-          <a:noFill/>
-          <a:ln w="19050">
-            <a:solidFill>
-              <a:srgbClr val="FF0000"/>
-            </a:solidFill>
-          </a:ln>
-        </p:spPr>
-        <p:style>
-          <a:lnRef idx="1">
-            <a:schemeClr val="accent1"/>
-          </a:lnRef>
-          <a:fillRef idx="3">
-            <a:schemeClr val="accent1"/>
-          </a:fillRef>
-          <a:effectRef idx="2">
-            <a:schemeClr val="accent1"/>
-          </a:effectRef>
-          <a:fontRef idx="minor">
-            <a:schemeClr val="lt1"/>
-          </a:fontRef>
-        </p:style>
-        <p:txBody>
-          <a:bodyPr rtlCol="0" anchor="ctr"/>
-          <a:lstStyle/>
-          <a:p>
-            <a:pPr algn="ctr"/>
-            <a:endParaRPr kumimoji="1" lang="ja-JP" altLang="en-US"/>
           </a:p>
         </p:txBody>
       </p:sp>

</xml_diff>

<commit_message>
Fix comment(Add description reload search page).#1240
</commit_message>
<xml_diff>
--- a/source/ArchitectureInDetail/WebApplicationDetail/images_Pagination/materialPagination.pptx
+++ b/source/ArchitectureInDetail/WebApplicationDetail/images_Pagination/materialPagination.pptx
@@ -254,7 +254,7 @@
             <a:fld id="{3BB47352-BF5A-4CD2-B029-996118CD8E01}" type="datetimeFigureOut">
               <a:rPr kumimoji="1" lang="ja-JP" altLang="en-US" smtClean="0"/>
               <a:pPr/>
-              <a:t>2016/11/9</a:t>
+              <a:t>2016/11/15</a:t>
             </a:fld>
             <a:endParaRPr kumimoji="1" lang="ja-JP" altLang="en-US"/>
           </a:p>
@@ -737,7 +737,7 @@
             <a:fld id="{7B9B12EC-6AA0-374B-A2D3-850081A07A26}" type="datetimeFigureOut">
               <a:rPr kumimoji="1" lang="ja-JP" altLang="en-US" smtClean="0"/>
               <a:pPr/>
-              <a:t>2016/11/9</a:t>
+              <a:t>2016/11/15</a:t>
             </a:fld>
             <a:endParaRPr kumimoji="1" lang="ja-JP" altLang="en-US"/>
           </a:p>
@@ -941,7 +941,7 @@
             <a:fld id="{7B9B12EC-6AA0-374B-A2D3-850081A07A26}" type="datetimeFigureOut">
               <a:rPr kumimoji="1" lang="ja-JP" altLang="en-US" smtClean="0"/>
               <a:pPr/>
-              <a:t>2016/11/9</a:t>
+              <a:t>2016/11/15</a:t>
             </a:fld>
             <a:endParaRPr kumimoji="1" lang="ja-JP" altLang="en-US"/>
           </a:p>
@@ -1155,7 +1155,7 @@
             <a:fld id="{7B9B12EC-6AA0-374B-A2D3-850081A07A26}" type="datetimeFigureOut">
               <a:rPr kumimoji="1" lang="ja-JP" altLang="en-US" smtClean="0"/>
               <a:pPr/>
-              <a:t>2016/11/9</a:t>
+              <a:t>2016/11/15</a:t>
             </a:fld>
             <a:endParaRPr kumimoji="1" lang="ja-JP" altLang="en-US"/>
           </a:p>
@@ -1359,7 +1359,7 @@
             <a:fld id="{7B9B12EC-6AA0-374B-A2D3-850081A07A26}" type="datetimeFigureOut">
               <a:rPr kumimoji="1" lang="ja-JP" altLang="en-US" smtClean="0"/>
               <a:pPr/>
-              <a:t>2016/11/9</a:t>
+              <a:t>2016/11/15</a:t>
             </a:fld>
             <a:endParaRPr kumimoji="1" lang="ja-JP" altLang="en-US"/>
           </a:p>
@@ -1607,7 +1607,7 @@
             <a:fld id="{7B9B12EC-6AA0-374B-A2D3-850081A07A26}" type="datetimeFigureOut">
               <a:rPr kumimoji="1" lang="ja-JP" altLang="en-US" smtClean="0"/>
               <a:pPr/>
-              <a:t>2016/11/9</a:t>
+              <a:t>2016/11/15</a:t>
             </a:fld>
             <a:endParaRPr kumimoji="1" lang="ja-JP" altLang="en-US"/>
           </a:p>
@@ -1961,7 +1961,7 @@
             <a:fld id="{7B9B12EC-6AA0-374B-A2D3-850081A07A26}" type="datetimeFigureOut">
               <a:rPr kumimoji="1" lang="ja-JP" altLang="en-US" smtClean="0"/>
               <a:pPr/>
-              <a:t>2016/11/9</a:t>
+              <a:t>2016/11/15</a:t>
             </a:fld>
             <a:endParaRPr kumimoji="1" lang="ja-JP" altLang="en-US"/>
           </a:p>
@@ -2449,7 +2449,7 @@
             <a:fld id="{7B9B12EC-6AA0-374B-A2D3-850081A07A26}" type="datetimeFigureOut">
               <a:rPr kumimoji="1" lang="ja-JP" altLang="en-US" smtClean="0"/>
               <a:pPr/>
-              <a:t>2016/11/9</a:t>
+              <a:t>2016/11/15</a:t>
             </a:fld>
             <a:endParaRPr kumimoji="1" lang="ja-JP" altLang="en-US"/>
           </a:p>
@@ -2569,7 +2569,7 @@
             <a:fld id="{7B9B12EC-6AA0-374B-A2D3-850081A07A26}" type="datetimeFigureOut">
               <a:rPr kumimoji="1" lang="ja-JP" altLang="en-US" smtClean="0"/>
               <a:pPr/>
-              <a:t>2016/11/9</a:t>
+              <a:t>2016/11/15</a:t>
             </a:fld>
             <a:endParaRPr kumimoji="1" lang="ja-JP" altLang="en-US"/>
           </a:p>
@@ -2666,7 +2666,7 @@
             <a:fld id="{7B9B12EC-6AA0-374B-A2D3-850081A07A26}" type="datetimeFigureOut">
               <a:rPr kumimoji="1" lang="ja-JP" altLang="en-US" smtClean="0"/>
               <a:pPr/>
-              <a:t>2016/11/9</a:t>
+              <a:t>2016/11/15</a:t>
             </a:fld>
             <a:endParaRPr kumimoji="1" lang="ja-JP" altLang="en-US"/>
           </a:p>
@@ -2977,7 +2977,7 @@
             <a:fld id="{7B9B12EC-6AA0-374B-A2D3-850081A07A26}" type="datetimeFigureOut">
               <a:rPr kumimoji="1" lang="ja-JP" altLang="en-US" smtClean="0"/>
               <a:pPr/>
-              <a:t>2016/11/9</a:t>
+              <a:t>2016/11/15</a:t>
             </a:fld>
             <a:endParaRPr kumimoji="1" lang="ja-JP" altLang="en-US"/>
           </a:p>
@@ -3232,7 +3232,7 @@
             <a:fld id="{7B9B12EC-6AA0-374B-A2D3-850081A07A26}" type="datetimeFigureOut">
               <a:rPr kumimoji="1" lang="ja-JP" altLang="en-US" smtClean="0"/>
               <a:pPr/>
-              <a:t>2016/11/9</a:t>
+              <a:t>2016/11/15</a:t>
             </a:fld>
             <a:endParaRPr kumimoji="1" lang="ja-JP" altLang="en-US"/>
           </a:p>
@@ -3479,7 +3479,7 @@
             <a:fld id="{7B9B12EC-6AA0-374B-A2D3-850081A07A26}" type="datetimeFigureOut">
               <a:rPr kumimoji="1" lang="ja-JP" altLang="en-US" smtClean="0"/>
               <a:pPr/>
-              <a:t>2016/11/9</a:t>
+              <a:t>2016/11/15</a:t>
             </a:fld>
             <a:endParaRPr kumimoji="1" lang="ja-JP" altLang="en-US"/>
           </a:p>
@@ -7143,8 +7143,8 @@
         </p:nvSpPr>
         <p:spPr>
           <a:xfrm>
-            <a:off x="744611" y="3415101"/>
-            <a:ext cx="2432861" cy="852099"/>
+            <a:off x="744611" y="3106881"/>
+            <a:ext cx="2432861" cy="1267691"/>
           </a:xfrm>
           <a:prstGeom prst="rect">
             <a:avLst/>
@@ -7169,11 +7169,47 @@
           <a:lstStyle/>
           <a:p>
             <a:pPr algn="ctr"/>
-            <a:r>
-              <a:rPr lang="en-US" altLang="ja-JP" sz="1600" dirty="0" err="1" smtClean="0"/>
+            <a:endParaRPr lang="en-US" altLang="ja-JP" sz="1600" b="1" dirty="0" smtClean="0">
+              <a:solidFill>
+                <a:prstClr val="black"/>
+              </a:solidFill>
+            </a:endParaRPr>
+          </a:p>
+          <a:p>
+            <a:pPr algn="ctr"/>
+            <a:endParaRPr lang="en-US" altLang="ja-JP" sz="1600" b="1" dirty="0">
+              <a:solidFill>
+                <a:prstClr val="black"/>
+              </a:solidFill>
+            </a:endParaRPr>
+          </a:p>
+          <a:p>
+            <a:pPr algn="ctr"/>
+            <a:r>
+              <a:rPr lang="en-US" altLang="ja-JP" sz="1600" b="1" dirty="0" err="1" smtClean="0">
+                <a:solidFill>
+                  <a:prstClr val="black"/>
+                </a:solidFill>
+              </a:rPr>
               <a:t>SessionArticleSearchForm</a:t>
             </a:r>
-            <a:endParaRPr lang="ja-JP" altLang="en-US" sz="1600" dirty="0">
+            <a:endParaRPr lang="en-US" altLang="ja-JP" sz="1600" b="1" dirty="0" smtClean="0">
+              <a:solidFill>
+                <a:prstClr val="black"/>
+              </a:solidFill>
+            </a:endParaRPr>
+          </a:p>
+          <a:p>
+            <a:pPr algn="ctr"/>
+            <a:r>
+              <a:rPr lang="en-US" altLang="ja-JP" sz="1600" b="1" dirty="0" err="1" smtClean="0">
+                <a:solidFill>
+                  <a:prstClr val="black"/>
+                </a:solidFill>
+              </a:rPr>
+              <a:t>Pageable</a:t>
+            </a:r>
+            <a:endParaRPr lang="en-US" altLang="ja-JP" sz="1600" b="1" dirty="0" smtClean="0">
               <a:solidFill>
                 <a:prstClr val="black"/>
               </a:solidFill>
@@ -7249,8 +7285,8 @@
         </p:nvSpPr>
         <p:spPr>
           <a:xfrm>
-            <a:off x="4414675" y="1756025"/>
-            <a:ext cx="3634303" cy="2060326"/>
+            <a:off x="4414675" y="1122217"/>
+            <a:ext cx="3634303" cy="2992582"/>
           </a:xfrm>
           <a:prstGeom prst="roundRect">
             <a:avLst/>
@@ -7298,7 +7334,7 @@
         </p:nvSpPr>
         <p:spPr>
           <a:xfrm>
-            <a:off x="4811871" y="2638003"/>
+            <a:off x="4811871" y="1910854"/>
             <a:ext cx="2839910" cy="857130"/>
           </a:xfrm>
           <a:prstGeom prst="roundRect">
@@ -7336,18 +7372,66 @@
           </a:p>
         </p:txBody>
       </p:sp>
+      <p:sp>
+        <p:nvSpPr>
+          <p:cNvPr id="4" name="正方形/長方形 3"/>
+          <p:cNvSpPr/>
+          <p:nvPr/>
+        </p:nvSpPr>
+        <p:spPr>
+          <a:xfrm>
+            <a:off x="744611" y="1545331"/>
+            <a:ext cx="2432861" cy="1174491"/>
+          </a:xfrm>
+          <a:prstGeom prst="rect">
+            <a:avLst/>
+          </a:prstGeom>
+        </p:spPr>
+        <p:style>
+          <a:lnRef idx="2">
+            <a:schemeClr val="accent1"/>
+          </a:lnRef>
+          <a:fillRef idx="1">
+            <a:schemeClr val="lt1"/>
+          </a:fillRef>
+          <a:effectRef idx="0">
+            <a:schemeClr val="accent1"/>
+          </a:effectRef>
+          <a:fontRef idx="minor">
+            <a:schemeClr val="dk1"/>
+          </a:fontRef>
+        </p:style>
+        <p:txBody>
+          <a:bodyPr rtlCol="0" anchor="t" anchorCtr="1"/>
+          <a:lstStyle/>
+          <a:p>
+            <a:pPr algn="ctr"/>
+            <a:endParaRPr lang="en-US" altLang="ja-JP" sz="1600" dirty="0" smtClean="0"/>
+          </a:p>
+          <a:p>
+            <a:pPr algn="ctr"/>
+            <a:endParaRPr lang="en-US" altLang="ja-JP" sz="1600" dirty="0"/>
+          </a:p>
+          <a:p>
+            <a:pPr algn="ctr"/>
+            <a:r>
+              <a:rPr lang="en-US" altLang="ja-JP" sz="1600" b="1" dirty="0" err="1" smtClean="0"/>
+              <a:t>SessionArticleSearchForm</a:t>
+            </a:r>
+            <a:endParaRPr lang="en-US" altLang="ja-JP" sz="1600" b="1" dirty="0" smtClean="0"/>
+          </a:p>
+        </p:txBody>
+      </p:sp>
       <p:cxnSp>
         <p:nvCxnSpPr>
-          <p:cNvPr id="106" name="直線矢印コネクタ 105"/>
-          <p:cNvCxnSpPr>
-            <a:stCxn id="24" idx="3"/>
-          </p:cNvCxnSpPr>
+          <p:cNvPr id="58" name="直線矢印コネクタ 57"/>
+          <p:cNvCxnSpPr/>
           <p:nvPr/>
         </p:nvCxnSpPr>
         <p:spPr>
-          <a:xfrm flipV="1">
-            <a:off x="3177472" y="3175000"/>
-            <a:ext cx="1634399" cy="666151"/>
+          <a:xfrm>
+            <a:off x="3179618" y="2047009"/>
+            <a:ext cx="1641764" cy="10391"/>
           </a:xfrm>
           <a:prstGeom prst="straightConnector1">
             <a:avLst/>
@@ -7375,60 +7459,74 @@
       </p:cxnSp>
       <p:sp>
         <p:nvSpPr>
-          <p:cNvPr id="4" name="正方形/長方形 3"/>
+          <p:cNvPr id="47" name="テキスト ボックス 46"/>
+          <p:cNvSpPr txBox="1"/>
+          <p:nvPr/>
+        </p:nvSpPr>
+        <p:spPr>
+          <a:xfrm>
+            <a:off x="773953" y="1517025"/>
+            <a:ext cx="442750" cy="369332"/>
+          </a:xfrm>
+          <a:prstGeom prst="rect">
+            <a:avLst/>
+          </a:prstGeom>
+          <a:noFill/>
+        </p:spPr>
+        <p:txBody>
+          <a:bodyPr wrap="none" rtlCol="0">
+            <a:spAutoFit/>
+          </a:bodyPr>
+          <a:lstStyle/>
+          <a:p>
+            <a:r>
+              <a:rPr kumimoji="1" lang="en-US" altLang="ja-JP" dirty="0" smtClean="0"/>
+              <a:t>(1)</a:t>
+            </a:r>
+            <a:endParaRPr kumimoji="1" lang="ja-JP" altLang="en-US" dirty="0"/>
+          </a:p>
+        </p:txBody>
+      </p:sp>
+      <p:sp>
+        <p:nvSpPr>
+          <p:cNvPr id="48" name="テキスト ボックス 47"/>
+          <p:cNvSpPr txBox="1"/>
+          <p:nvPr/>
+        </p:nvSpPr>
+        <p:spPr>
+          <a:xfrm>
+            <a:off x="773953" y="3119973"/>
+            <a:ext cx="442750" cy="369332"/>
+          </a:xfrm>
+          <a:prstGeom prst="rect">
+            <a:avLst/>
+          </a:prstGeom>
+          <a:noFill/>
+        </p:spPr>
+        <p:txBody>
+          <a:bodyPr wrap="none" rtlCol="0">
+            <a:spAutoFit/>
+          </a:bodyPr>
+          <a:lstStyle/>
+          <a:p>
+            <a:r>
+              <a:rPr kumimoji="1" lang="en-US" altLang="ja-JP" dirty="0" smtClean="0"/>
+              <a:t>(2)</a:t>
+            </a:r>
+            <a:endParaRPr kumimoji="1" lang="ja-JP" altLang="en-US" dirty="0"/>
+          </a:p>
+        </p:txBody>
+      </p:sp>
+      <p:sp>
+        <p:nvSpPr>
+          <p:cNvPr id="14" name="角丸四角形 13"/>
           <p:cNvSpPr/>
           <p:nvPr/>
         </p:nvSpPr>
         <p:spPr>
           <a:xfrm>
-            <a:off x="744611" y="1649242"/>
-            <a:ext cx="2432861" cy="1021990"/>
-          </a:xfrm>
-          <a:prstGeom prst="rect">
-            <a:avLst/>
-          </a:prstGeom>
-        </p:spPr>
-        <p:style>
-          <a:lnRef idx="2">
-            <a:schemeClr val="accent1"/>
-          </a:lnRef>
-          <a:fillRef idx="1">
-            <a:schemeClr val="lt1"/>
-          </a:fillRef>
-          <a:effectRef idx="0">
-            <a:schemeClr val="accent1"/>
-          </a:effectRef>
-          <a:fontRef idx="minor">
-            <a:schemeClr val="dk1"/>
-          </a:fontRef>
-        </p:style>
-        <p:txBody>
-          <a:bodyPr rtlCol="0" anchor="t" anchorCtr="1"/>
-          <a:lstStyle/>
-          <a:p>
-            <a:pPr algn="ctr"/>
-            <a:r>
-              <a:rPr lang="en-US" altLang="ja-JP" sz="1600" dirty="0" err="1" smtClean="0"/>
-              <a:t>SessionArticleSearchForm</a:t>
-            </a:r>
-            <a:endParaRPr lang="ja-JP" altLang="en-US" sz="1600" dirty="0">
-              <a:solidFill>
-                <a:prstClr val="black"/>
-              </a:solidFill>
-            </a:endParaRPr>
-          </a:p>
-        </p:txBody>
-      </p:sp>
-      <p:sp>
-        <p:nvSpPr>
-          <p:cNvPr id="5" name="角丸四角形 4"/>
-          <p:cNvSpPr/>
-          <p:nvPr/>
-        </p:nvSpPr>
-        <p:spPr>
-          <a:xfrm>
-            <a:off x="1673009" y="2136930"/>
-            <a:ext cx="576063" cy="194054"/>
+            <a:off x="4809638" y="2937272"/>
+            <a:ext cx="2839910" cy="857130"/>
           </a:xfrm>
           <a:prstGeom prst="roundRect">
             <a:avLst/>
@@ -7454,14 +7552,10 @@
           <a:p>
             <a:pPr algn="ctr"/>
             <a:r>
-              <a:rPr lang="en-US" altLang="ja-JP" sz="1100" dirty="0" smtClean="0">
-                <a:solidFill>
-                  <a:prstClr val="white"/>
-                </a:solidFill>
-              </a:rPr>
-              <a:t>search</a:t>
-            </a:r>
-            <a:endParaRPr lang="ja-JP" altLang="en-US" sz="1100" dirty="0">
+              <a:rPr lang="en-US" altLang="ja-JP" dirty="0" err="1"/>
+              <a:t>Pageable</a:t>
+            </a:r>
+            <a:endParaRPr lang="ja-JP" altLang="en-US" dirty="0">
               <a:solidFill>
                 <a:prstClr val="white"/>
               </a:solidFill>
@@ -7469,72 +7563,18 @@
           </a:p>
         </p:txBody>
       </p:sp>
-      <p:pic>
-        <p:nvPicPr>
-          <p:cNvPr id="32" name="Picture 2"/>
-          <p:cNvPicPr>
-            <a:picLocks noChangeAspect="1" noChangeArrowheads="1"/>
-          </p:cNvPicPr>
-          <p:nvPr/>
-        </p:nvPicPr>
-        <p:blipFill>
-          <a:blip r:embed="rId2">
-            <a:extLst>
-              <a:ext uri="{28A0092B-C50C-407E-A947-70E740481C1C}">
-                <a14:useLocalDpi xmlns:a14="http://schemas.microsoft.com/office/drawing/2010/main" val="0"/>
-              </a:ext>
-            </a:extLst>
-          </a:blip>
-          <a:srcRect/>
-          <a:stretch>
-            <a:fillRect/>
-          </a:stretch>
-        </p:blipFill>
-        <p:spPr bwMode="auto">
-          <a:xfrm>
-            <a:off x="1214594" y="3835388"/>
-            <a:ext cx="1492891" cy="330895"/>
-          </a:xfrm>
-          <a:prstGeom prst="rect">
-            <a:avLst/>
-          </a:prstGeom>
-          <a:noFill/>
-          <a:ln>
-            <a:noFill/>
-          </a:ln>
-          <a:extLst>
-            <a:ext uri="{909E8E84-426E-40DD-AFC4-6F175D3DCCD1}">
-              <a14:hiddenFill xmlns:a14="http://schemas.microsoft.com/office/drawing/2010/main">
-                <a:solidFill>
-                  <a:schemeClr val="accent1"/>
-                </a:solidFill>
-              </a14:hiddenFill>
-            </a:ext>
-            <a:ext uri="{91240B29-F687-4F45-9708-019B960494DF}">
-              <a14:hiddenLine xmlns:a14="http://schemas.microsoft.com/office/drawing/2010/main" w="9525">
-                <a:solidFill>
-                  <a:schemeClr val="tx1"/>
-                </a:solidFill>
-                <a:miter lim="800000"/>
-                <a:headEnd/>
-                <a:tailEnd/>
-              </a14:hiddenLine>
-            </a:ext>
-          </a:extLst>
-        </p:spPr>
-      </p:pic>
       <p:cxnSp>
         <p:nvCxnSpPr>
-          <p:cNvPr id="58" name="直線矢印コネクタ 57"/>
+          <p:cNvPr id="29" name="直線矢印コネクタ 28"/>
           <p:cNvCxnSpPr>
-            <a:stCxn id="4" idx="3"/>
+            <a:endCxn id="14" idx="1"/>
           </p:cNvCxnSpPr>
           <p:nvPr/>
         </p:nvCxnSpPr>
         <p:spPr>
           <a:xfrm>
-            <a:off x="3177472" y="2160237"/>
-            <a:ext cx="1634399" cy="877066"/>
+            <a:off x="3177469" y="2338165"/>
+            <a:ext cx="1632169" cy="1027672"/>
           </a:xfrm>
           <a:prstGeom prst="straightConnector1">
             <a:avLst/>
@@ -7562,23 +7602,23 @@
       </p:cxnSp>
       <p:cxnSp>
         <p:nvCxnSpPr>
-          <p:cNvPr id="20" name="直線矢印コネクタ 19"/>
+          <p:cNvPr id="31" name="直線矢印コネクタ 30"/>
           <p:cNvCxnSpPr>
-            <a:stCxn id="4" idx="2"/>
-            <a:endCxn id="24" idx="0"/>
+            <a:stCxn id="74" idx="1"/>
           </p:cNvCxnSpPr>
           <p:nvPr/>
         </p:nvCxnSpPr>
         <p:spPr>
-          <a:xfrm>
-            <a:off x="1961042" y="2671232"/>
-            <a:ext cx="0" cy="743869"/>
+          <a:xfrm flipH="1">
+            <a:off x="3206816" y="2339419"/>
+            <a:ext cx="1605055" cy="912794"/>
           </a:xfrm>
           <a:prstGeom prst="straightConnector1">
             <a:avLst/>
           </a:prstGeom>
-          <a:ln>
-            <a:headEnd type="arrow"/>
+          <a:ln w="9525">
+            <a:prstDash val="dash"/>
+            <a:headEnd type="none"/>
             <a:tailEnd type="arrow"/>
           </a:ln>
         </p:spPr>
@@ -7597,66 +7637,78 @@
           </a:fontRef>
         </p:style>
       </p:cxnSp>
-      <p:sp>
-        <p:nvSpPr>
-          <p:cNvPr id="47" name="テキスト ボックス 46"/>
-          <p:cNvSpPr txBox="1"/>
-          <p:nvPr/>
-        </p:nvSpPr>
-        <p:spPr>
-          <a:xfrm>
-            <a:off x="1119118" y="2008163"/>
-            <a:ext cx="442750" cy="369332"/>
-          </a:xfrm>
-          <a:prstGeom prst="rect">
-            <a:avLst/>
-          </a:prstGeom>
-          <a:noFill/>
-        </p:spPr>
-        <p:txBody>
-          <a:bodyPr wrap="none" rtlCol="0">
-            <a:spAutoFit/>
-          </a:bodyPr>
-          <a:lstStyle/>
-          <a:p>
-            <a:r>
-              <a:rPr kumimoji="1" lang="en-US" altLang="ja-JP" dirty="0" smtClean="0"/>
-              <a:t>(1)</a:t>
-            </a:r>
-            <a:endParaRPr kumimoji="1" lang="ja-JP" altLang="en-US" dirty="0"/>
-          </a:p>
-        </p:txBody>
-      </p:sp>
-      <p:sp>
-        <p:nvSpPr>
-          <p:cNvPr id="48" name="テキスト ボックス 47"/>
-          <p:cNvSpPr txBox="1"/>
-          <p:nvPr/>
-        </p:nvSpPr>
-        <p:spPr>
-          <a:xfrm>
-            <a:off x="836299" y="3816170"/>
-            <a:ext cx="442750" cy="369332"/>
-          </a:xfrm>
-          <a:prstGeom prst="rect">
-            <a:avLst/>
-          </a:prstGeom>
-          <a:noFill/>
-        </p:spPr>
-        <p:txBody>
-          <a:bodyPr wrap="none" rtlCol="0">
-            <a:spAutoFit/>
-          </a:bodyPr>
-          <a:lstStyle/>
-          <a:p>
-            <a:r>
-              <a:rPr kumimoji="1" lang="en-US" altLang="ja-JP" dirty="0" smtClean="0"/>
-              <a:t>(2)</a:t>
-            </a:r>
-            <a:endParaRPr kumimoji="1" lang="ja-JP" altLang="en-US" dirty="0"/>
-          </a:p>
-        </p:txBody>
-      </p:sp>
+      <p:cxnSp>
+        <p:nvCxnSpPr>
+          <p:cNvPr id="35" name="直線矢印コネクタ 34"/>
+          <p:cNvCxnSpPr/>
+          <p:nvPr/>
+        </p:nvCxnSpPr>
+        <p:spPr>
+          <a:xfrm flipH="1">
+            <a:off x="3179618" y="3666259"/>
+            <a:ext cx="1630020" cy="22514"/>
+          </a:xfrm>
+          <a:prstGeom prst="straightConnector1">
+            <a:avLst/>
+          </a:prstGeom>
+          <a:ln w="9525">
+            <a:prstDash val="dash"/>
+            <a:headEnd type="none"/>
+            <a:tailEnd type="arrow"/>
+          </a:ln>
+        </p:spPr>
+        <p:style>
+          <a:lnRef idx="2">
+            <a:schemeClr val="accent1"/>
+          </a:lnRef>
+          <a:fillRef idx="0">
+            <a:schemeClr val="accent1"/>
+          </a:fillRef>
+          <a:effectRef idx="1">
+            <a:schemeClr val="accent1"/>
+          </a:effectRef>
+          <a:fontRef idx="minor">
+            <a:schemeClr val="tx1"/>
+          </a:fontRef>
+        </p:style>
+      </p:cxnSp>
+      <p:cxnSp>
+        <p:nvCxnSpPr>
+          <p:cNvPr id="63" name="直線矢印コネクタ 62"/>
+          <p:cNvCxnSpPr>
+            <a:stCxn id="4" idx="2"/>
+            <a:endCxn id="24" idx="0"/>
+          </p:cNvCxnSpPr>
+          <p:nvPr/>
+        </p:nvCxnSpPr>
+        <p:spPr>
+          <a:xfrm>
+            <a:off x="1961042" y="2719822"/>
+            <a:ext cx="0" cy="387059"/>
+          </a:xfrm>
+          <a:prstGeom prst="straightConnector1">
+            <a:avLst/>
+          </a:prstGeom>
+          <a:ln>
+            <a:headEnd type="arrow"/>
+            <a:tailEnd type="arrow"/>
+          </a:ln>
+        </p:spPr>
+        <p:style>
+          <a:lnRef idx="2">
+            <a:schemeClr val="accent1"/>
+          </a:lnRef>
+          <a:fillRef idx="0">
+            <a:schemeClr val="accent1"/>
+          </a:fillRef>
+          <a:effectRef idx="1">
+            <a:schemeClr val="accent1"/>
+          </a:effectRef>
+          <a:fontRef idx="minor">
+            <a:schemeClr val="tx1"/>
+          </a:fontRef>
+        </p:style>
+      </p:cxnSp>
     </p:spTree>
     <p:extLst>
       <p:ext uri="{BB962C8B-B14F-4D97-AF65-F5344CB8AC3E}">

</xml_diff>

<commit_message>
modify session pagination prochart.#1240
</commit_message>
<xml_diff>
--- a/source/ArchitectureInDetail/WebApplicationDetail/images_Pagination/materialPagination.pptx
+++ b/source/ArchitectureInDetail/WebApplicationDetail/images_Pagination/materialPagination.pptx
@@ -254,7 +254,7 @@
             <a:fld id="{3BB47352-BF5A-4CD2-B029-996118CD8E01}" type="datetimeFigureOut">
               <a:rPr kumimoji="1" lang="ja-JP" altLang="en-US" smtClean="0"/>
               <a:pPr/>
-              <a:t>2016/11/15</a:t>
+              <a:t>2016/11/17</a:t>
             </a:fld>
             <a:endParaRPr kumimoji="1" lang="ja-JP" altLang="en-US"/>
           </a:p>
@@ -737,7 +737,7 @@
             <a:fld id="{7B9B12EC-6AA0-374B-A2D3-850081A07A26}" type="datetimeFigureOut">
               <a:rPr kumimoji="1" lang="ja-JP" altLang="en-US" smtClean="0"/>
               <a:pPr/>
-              <a:t>2016/11/15</a:t>
+              <a:t>2016/11/17</a:t>
             </a:fld>
             <a:endParaRPr kumimoji="1" lang="ja-JP" altLang="en-US"/>
           </a:p>
@@ -941,7 +941,7 @@
             <a:fld id="{7B9B12EC-6AA0-374B-A2D3-850081A07A26}" type="datetimeFigureOut">
               <a:rPr kumimoji="1" lang="ja-JP" altLang="en-US" smtClean="0"/>
               <a:pPr/>
-              <a:t>2016/11/15</a:t>
+              <a:t>2016/11/17</a:t>
             </a:fld>
             <a:endParaRPr kumimoji="1" lang="ja-JP" altLang="en-US"/>
           </a:p>
@@ -1155,7 +1155,7 @@
             <a:fld id="{7B9B12EC-6AA0-374B-A2D3-850081A07A26}" type="datetimeFigureOut">
               <a:rPr kumimoji="1" lang="ja-JP" altLang="en-US" smtClean="0"/>
               <a:pPr/>
-              <a:t>2016/11/15</a:t>
+              <a:t>2016/11/17</a:t>
             </a:fld>
             <a:endParaRPr kumimoji="1" lang="ja-JP" altLang="en-US"/>
           </a:p>
@@ -1359,7 +1359,7 @@
             <a:fld id="{7B9B12EC-6AA0-374B-A2D3-850081A07A26}" type="datetimeFigureOut">
               <a:rPr kumimoji="1" lang="ja-JP" altLang="en-US" smtClean="0"/>
               <a:pPr/>
-              <a:t>2016/11/15</a:t>
+              <a:t>2016/11/17</a:t>
             </a:fld>
             <a:endParaRPr kumimoji="1" lang="ja-JP" altLang="en-US"/>
           </a:p>
@@ -1607,7 +1607,7 @@
             <a:fld id="{7B9B12EC-6AA0-374B-A2D3-850081A07A26}" type="datetimeFigureOut">
               <a:rPr kumimoji="1" lang="ja-JP" altLang="en-US" smtClean="0"/>
               <a:pPr/>
-              <a:t>2016/11/15</a:t>
+              <a:t>2016/11/17</a:t>
             </a:fld>
             <a:endParaRPr kumimoji="1" lang="ja-JP" altLang="en-US"/>
           </a:p>
@@ -1961,7 +1961,7 @@
             <a:fld id="{7B9B12EC-6AA0-374B-A2D3-850081A07A26}" type="datetimeFigureOut">
               <a:rPr kumimoji="1" lang="ja-JP" altLang="en-US" smtClean="0"/>
               <a:pPr/>
-              <a:t>2016/11/15</a:t>
+              <a:t>2016/11/17</a:t>
             </a:fld>
             <a:endParaRPr kumimoji="1" lang="ja-JP" altLang="en-US"/>
           </a:p>
@@ -2449,7 +2449,7 @@
             <a:fld id="{7B9B12EC-6AA0-374B-A2D3-850081A07A26}" type="datetimeFigureOut">
               <a:rPr kumimoji="1" lang="ja-JP" altLang="en-US" smtClean="0"/>
               <a:pPr/>
-              <a:t>2016/11/15</a:t>
+              <a:t>2016/11/17</a:t>
             </a:fld>
             <a:endParaRPr kumimoji="1" lang="ja-JP" altLang="en-US"/>
           </a:p>
@@ -2569,7 +2569,7 @@
             <a:fld id="{7B9B12EC-6AA0-374B-A2D3-850081A07A26}" type="datetimeFigureOut">
               <a:rPr kumimoji="1" lang="ja-JP" altLang="en-US" smtClean="0"/>
               <a:pPr/>
-              <a:t>2016/11/15</a:t>
+              <a:t>2016/11/17</a:t>
             </a:fld>
             <a:endParaRPr kumimoji="1" lang="ja-JP" altLang="en-US"/>
           </a:p>
@@ -2666,7 +2666,7 @@
             <a:fld id="{7B9B12EC-6AA0-374B-A2D3-850081A07A26}" type="datetimeFigureOut">
               <a:rPr kumimoji="1" lang="ja-JP" altLang="en-US" smtClean="0"/>
               <a:pPr/>
-              <a:t>2016/11/15</a:t>
+              <a:t>2016/11/17</a:t>
             </a:fld>
             <a:endParaRPr kumimoji="1" lang="ja-JP" altLang="en-US"/>
           </a:p>
@@ -2977,7 +2977,7 @@
             <a:fld id="{7B9B12EC-6AA0-374B-A2D3-850081A07A26}" type="datetimeFigureOut">
               <a:rPr kumimoji="1" lang="ja-JP" altLang="en-US" smtClean="0"/>
               <a:pPr/>
-              <a:t>2016/11/15</a:t>
+              <a:t>2016/11/17</a:t>
             </a:fld>
             <a:endParaRPr kumimoji="1" lang="ja-JP" altLang="en-US"/>
           </a:p>
@@ -3232,7 +3232,7 @@
             <a:fld id="{7B9B12EC-6AA0-374B-A2D3-850081A07A26}" type="datetimeFigureOut">
               <a:rPr kumimoji="1" lang="ja-JP" altLang="en-US" smtClean="0"/>
               <a:pPr/>
-              <a:t>2016/11/15</a:t>
+              <a:t>2016/11/17</a:t>
             </a:fld>
             <a:endParaRPr kumimoji="1" lang="ja-JP" altLang="en-US"/>
           </a:p>
@@ -3479,7 +3479,7 @@
             <a:fld id="{7B9B12EC-6AA0-374B-A2D3-850081A07A26}" type="datetimeFigureOut">
               <a:rPr kumimoji="1" lang="ja-JP" altLang="en-US" smtClean="0"/>
               <a:pPr/>
-              <a:t>2016/11/15</a:t>
+              <a:t>2016/11/17</a:t>
             </a:fld>
             <a:endParaRPr kumimoji="1" lang="ja-JP" altLang="en-US"/>
           </a:p>
@@ -7137,96 +7137,14 @@
       </p:grpSpPr>
       <p:sp>
         <p:nvSpPr>
-          <p:cNvPr id="24" name="正方形/長方形 23"/>
-          <p:cNvSpPr/>
-          <p:nvPr/>
-        </p:nvSpPr>
-        <p:spPr>
-          <a:xfrm>
-            <a:off x="744611" y="3106881"/>
-            <a:ext cx="2432861" cy="1267691"/>
-          </a:xfrm>
-          <a:prstGeom prst="rect">
-            <a:avLst/>
-          </a:prstGeom>
-        </p:spPr>
-        <p:style>
-          <a:lnRef idx="2">
-            <a:schemeClr val="accent1"/>
-          </a:lnRef>
-          <a:fillRef idx="1">
-            <a:schemeClr val="lt1"/>
-          </a:fillRef>
-          <a:effectRef idx="0">
-            <a:schemeClr val="accent1"/>
-          </a:effectRef>
-          <a:fontRef idx="minor">
-            <a:schemeClr val="dk1"/>
-          </a:fontRef>
-        </p:style>
-        <p:txBody>
-          <a:bodyPr rtlCol="0" anchor="t" anchorCtr="1"/>
-          <a:lstStyle/>
-          <a:p>
-            <a:pPr algn="ctr"/>
-            <a:endParaRPr lang="en-US" altLang="ja-JP" sz="1600" b="1" dirty="0" smtClean="0">
-              <a:solidFill>
-                <a:prstClr val="black"/>
-              </a:solidFill>
-            </a:endParaRPr>
-          </a:p>
-          <a:p>
-            <a:pPr algn="ctr"/>
-            <a:endParaRPr lang="en-US" altLang="ja-JP" sz="1600" b="1" dirty="0">
-              <a:solidFill>
-                <a:prstClr val="black"/>
-              </a:solidFill>
-            </a:endParaRPr>
-          </a:p>
-          <a:p>
-            <a:pPr algn="ctr"/>
-            <a:r>
-              <a:rPr lang="en-US" altLang="ja-JP" sz="1600" b="1" dirty="0" err="1" smtClean="0">
-                <a:solidFill>
-                  <a:prstClr val="black"/>
-                </a:solidFill>
-              </a:rPr>
-              <a:t>SessionArticleSearchForm</a:t>
-            </a:r>
-            <a:endParaRPr lang="en-US" altLang="ja-JP" sz="1600" b="1" dirty="0" smtClean="0">
-              <a:solidFill>
-                <a:prstClr val="black"/>
-              </a:solidFill>
-            </a:endParaRPr>
-          </a:p>
-          <a:p>
-            <a:pPr algn="ctr"/>
-            <a:r>
-              <a:rPr lang="en-US" altLang="ja-JP" sz="1600" b="1" dirty="0" err="1" smtClean="0">
-                <a:solidFill>
-                  <a:prstClr val="black"/>
-                </a:solidFill>
-              </a:rPr>
-              <a:t>Pageable</a:t>
-            </a:r>
-            <a:endParaRPr lang="en-US" altLang="ja-JP" sz="1600" b="1" dirty="0" smtClean="0">
-              <a:solidFill>
-                <a:prstClr val="black"/>
-              </a:solidFill>
-            </a:endParaRPr>
-          </a:p>
-        </p:txBody>
-      </p:sp>
-      <p:sp>
-        <p:nvSpPr>
           <p:cNvPr id="15" name="角丸四角形 14"/>
           <p:cNvSpPr/>
           <p:nvPr/>
         </p:nvSpPr>
         <p:spPr>
           <a:xfrm>
-            <a:off x="363011" y="558799"/>
-            <a:ext cx="3171824" cy="4775201"/>
+            <a:off x="363011" y="558801"/>
+            <a:ext cx="3484160" cy="2972093"/>
           </a:xfrm>
           <a:prstGeom prst="roundRect">
             <a:avLst/>
@@ -7262,12 +7180,12 @@
           <a:p>
             <a:pPr algn="ctr"/>
             <a:r>
-              <a:rPr lang="en-US" altLang="ja-JP" dirty="0" smtClean="0">
+              <a:rPr lang="en-US" altLang="ja-JP" dirty="0" err="1" smtClean="0">
                 <a:solidFill>
                   <a:schemeClr val="accent1"/>
                 </a:solidFill>
               </a:rPr>
-              <a:t>Controller</a:t>
+              <a:t>SessionArticleSearchController</a:t>
             </a:r>
             <a:endParaRPr kumimoji="1" lang="ja-JP" altLang="en-US" dirty="0">
               <a:solidFill>
@@ -7285,7 +7203,7 @@
         </p:nvSpPr>
         <p:spPr>
           <a:xfrm>
-            <a:off x="4414675" y="1122217"/>
+            <a:off x="4626544" y="720772"/>
             <a:ext cx="3634303" cy="2992582"/>
           </a:xfrm>
           <a:prstGeom prst="roundRect">
@@ -7334,8 +7252,8 @@
         </p:nvSpPr>
         <p:spPr>
           <a:xfrm>
-            <a:off x="4811871" y="1910854"/>
-            <a:ext cx="2839910" cy="857130"/>
+            <a:off x="5023740" y="1609768"/>
+            <a:ext cx="2839910" cy="667696"/>
           </a:xfrm>
           <a:prstGeom prst="roundRect">
             <a:avLst/>
@@ -7380,8 +7298,8 @@
         </p:nvSpPr>
         <p:spPr>
           <a:xfrm>
-            <a:off x="744611" y="1545331"/>
-            <a:ext cx="2432861" cy="1174491"/>
+            <a:off x="579863" y="1143887"/>
+            <a:ext cx="3077737" cy="820612"/>
           </a:xfrm>
           <a:prstGeom prst="rect">
             <a:avLst/>
@@ -7406,14 +7324,6 @@
           <a:lstStyle/>
           <a:p>
             <a:pPr algn="ctr"/>
-            <a:endParaRPr lang="en-US" altLang="ja-JP" sz="1600" dirty="0" smtClean="0"/>
-          </a:p>
-          <a:p>
-            <a:pPr algn="ctr"/>
-            <a:endParaRPr lang="en-US" altLang="ja-JP" sz="1600" dirty="0"/>
-          </a:p>
-          <a:p>
-            <a:pPr algn="ctr"/>
             <a:r>
               <a:rPr lang="en-US" altLang="ja-JP" sz="1600" b="1" dirty="0" err="1" smtClean="0"/>
               <a:t>SessionArticleSearchForm</a:t>
@@ -7429,9 +7339,9 @@
           <p:nvPr/>
         </p:nvCxnSpPr>
         <p:spPr>
-          <a:xfrm>
-            <a:off x="3179618" y="2047009"/>
-            <a:ext cx="1641764" cy="10391"/>
+          <a:xfrm flipV="1">
+            <a:off x="3670868" y="2471527"/>
+            <a:ext cx="1202214" cy="394858"/>
           </a:xfrm>
           <a:prstGeom prst="straightConnector1">
             <a:avLst/>
@@ -7465,7 +7375,7 @@
         </p:nvSpPr>
         <p:spPr>
           <a:xfrm>
-            <a:off x="773953" y="1517025"/>
+            <a:off x="584384" y="1160184"/>
             <a:ext cx="442750" cy="369332"/>
           </a:xfrm>
           <a:prstGeom prst="rect">
@@ -7489,44 +7399,14 @@
       </p:sp>
       <p:sp>
         <p:nvSpPr>
-          <p:cNvPr id="48" name="テキスト ボックス 47"/>
-          <p:cNvSpPr txBox="1"/>
-          <p:nvPr/>
-        </p:nvSpPr>
-        <p:spPr>
-          <a:xfrm>
-            <a:off x="773953" y="3119973"/>
-            <a:ext cx="442750" cy="369332"/>
-          </a:xfrm>
-          <a:prstGeom prst="rect">
-            <a:avLst/>
-          </a:prstGeom>
-          <a:noFill/>
-        </p:spPr>
-        <p:txBody>
-          <a:bodyPr wrap="none" rtlCol="0">
-            <a:spAutoFit/>
-          </a:bodyPr>
-          <a:lstStyle/>
-          <a:p>
-            <a:r>
-              <a:rPr kumimoji="1" lang="en-US" altLang="ja-JP" dirty="0" smtClean="0"/>
-              <a:t>(2)</a:t>
-            </a:r>
-            <a:endParaRPr kumimoji="1" lang="ja-JP" altLang="en-US" dirty="0"/>
-          </a:p>
-        </p:txBody>
-      </p:sp>
-      <p:sp>
-        <p:nvSpPr>
           <p:cNvPr id="14" name="角丸四角形 13"/>
           <p:cNvSpPr/>
           <p:nvPr/>
         </p:nvSpPr>
         <p:spPr>
           <a:xfrm>
-            <a:off x="4809638" y="2937272"/>
-            <a:ext cx="2839910" cy="857130"/>
+            <a:off x="5021507" y="2390864"/>
+            <a:ext cx="2839910" cy="717445"/>
           </a:xfrm>
           <a:prstGeom prst="roundRect">
             <a:avLst/>
@@ -7565,23 +7445,21 @@
       </p:sp>
       <p:cxnSp>
         <p:nvCxnSpPr>
-          <p:cNvPr id="29" name="直線矢印コネクタ 28"/>
-          <p:cNvCxnSpPr>
-            <a:endCxn id="14" idx="1"/>
-          </p:cNvCxnSpPr>
+          <p:cNvPr id="35" name="直線矢印コネクタ 34"/>
+          <p:cNvCxnSpPr/>
           <p:nvPr/>
         </p:nvCxnSpPr>
         <p:spPr>
-          <a:xfrm>
-            <a:off x="3177469" y="2338165"/>
-            <a:ext cx="1632169" cy="1027672"/>
+          <a:xfrm flipH="1" flipV="1">
+            <a:off x="3679902" y="1553572"/>
+            <a:ext cx="1193180" cy="510500"/>
           </a:xfrm>
           <a:prstGeom prst="straightConnector1">
             <a:avLst/>
           </a:prstGeom>
           <a:ln w="9525">
             <a:prstDash val="dash"/>
-            <a:headEnd type="none"/>
+            <a:headEnd type="arrow"/>
             <a:tailEnd type="arrow"/>
           </a:ln>
         </p:spPr>
@@ -7600,25 +7478,169 @@
           </a:fontRef>
         </p:style>
       </p:cxnSp>
+      <p:sp>
+        <p:nvSpPr>
+          <p:cNvPr id="18" name="角丸四角形 17"/>
+          <p:cNvSpPr/>
+          <p:nvPr/>
+        </p:nvSpPr>
+        <p:spPr>
+          <a:xfrm>
+            <a:off x="363011" y="3779045"/>
+            <a:ext cx="3484160" cy="1622285"/>
+          </a:xfrm>
+          <a:prstGeom prst="roundRect">
+            <a:avLst/>
+          </a:prstGeom>
+          <a:noFill/>
+          <a:ln w="31750">
+            <a:solidFill>
+              <a:schemeClr val="accent1">
+                <a:shade val="95000"/>
+                <a:satMod val="105000"/>
+              </a:schemeClr>
+            </a:solidFill>
+            <a:prstDash val="dash"/>
+          </a:ln>
+        </p:spPr>
+        <p:style>
+          <a:lnRef idx="1">
+            <a:schemeClr val="accent1"/>
+          </a:lnRef>
+          <a:fillRef idx="3">
+            <a:schemeClr val="accent1"/>
+          </a:fillRef>
+          <a:effectRef idx="2">
+            <a:schemeClr val="accent1"/>
+          </a:effectRef>
+          <a:fontRef idx="minor">
+            <a:schemeClr val="lt1"/>
+          </a:fontRef>
+        </p:style>
+        <p:txBody>
+          <a:bodyPr rtlCol="0" anchor="t" anchorCtr="0"/>
+          <a:lstStyle/>
+          <a:p>
+            <a:pPr algn="ctr"/>
+            <a:r>
+              <a:rPr lang="en-US" altLang="ja-JP" dirty="0" err="1" smtClean="0">
+                <a:solidFill>
+                  <a:schemeClr val="accent1"/>
+                </a:solidFill>
+              </a:rPr>
+              <a:t>SessionArticleDetailController</a:t>
+            </a:r>
+            <a:endParaRPr kumimoji="1" lang="ja-JP" altLang="en-US" dirty="0">
+              <a:solidFill>
+                <a:schemeClr val="accent1"/>
+              </a:solidFill>
+            </a:endParaRPr>
+          </a:p>
+        </p:txBody>
+      </p:sp>
+      <p:sp>
+        <p:nvSpPr>
+          <p:cNvPr id="17" name="正方形/長方形 16"/>
+          <p:cNvSpPr/>
+          <p:nvPr/>
+        </p:nvSpPr>
+        <p:spPr>
+          <a:xfrm>
+            <a:off x="579861" y="2432660"/>
+            <a:ext cx="3077737" cy="820612"/>
+          </a:xfrm>
+          <a:prstGeom prst="rect">
+            <a:avLst/>
+          </a:prstGeom>
+        </p:spPr>
+        <p:style>
+          <a:lnRef idx="2">
+            <a:schemeClr val="accent1"/>
+          </a:lnRef>
+          <a:fillRef idx="1">
+            <a:schemeClr val="lt1"/>
+          </a:fillRef>
+          <a:effectRef idx="0">
+            <a:schemeClr val="accent1"/>
+          </a:effectRef>
+          <a:fontRef idx="minor">
+            <a:schemeClr val="dk1"/>
+          </a:fontRef>
+        </p:style>
+        <p:txBody>
+          <a:bodyPr rtlCol="0" anchor="t" anchorCtr="1"/>
+          <a:lstStyle/>
+          <a:p>
+            <a:pPr algn="ctr"/>
+            <a:r>
+              <a:rPr lang="en-US" altLang="ja-JP" sz="1600" b="1" dirty="0" err="1" smtClean="0"/>
+              <a:t>SessionArticleSearchForm</a:t>
+            </a:r>
+            <a:endParaRPr lang="en-US" altLang="ja-JP" sz="1600" b="1" dirty="0" smtClean="0"/>
+          </a:p>
+          <a:p>
+            <a:pPr algn="ctr"/>
+            <a:r>
+              <a:rPr lang="en-US" altLang="ja-JP" sz="1600" b="1" dirty="0" err="1">
+                <a:solidFill>
+                  <a:prstClr val="black"/>
+                </a:solidFill>
+              </a:rPr>
+              <a:t>Pageable</a:t>
+            </a:r>
+            <a:endParaRPr lang="en-US" altLang="ja-JP" sz="1600" b="1" dirty="0" smtClean="0"/>
+          </a:p>
+        </p:txBody>
+      </p:sp>
+      <p:sp>
+        <p:nvSpPr>
+          <p:cNvPr id="21" name="テキスト ボックス 20"/>
+          <p:cNvSpPr txBox="1"/>
+          <p:nvPr/>
+        </p:nvSpPr>
+        <p:spPr>
+          <a:xfrm>
+            <a:off x="591821" y="2438861"/>
+            <a:ext cx="442750" cy="369332"/>
+          </a:xfrm>
+          <a:prstGeom prst="rect">
+            <a:avLst/>
+          </a:prstGeom>
+          <a:noFill/>
+        </p:spPr>
+        <p:txBody>
+          <a:bodyPr wrap="none" rtlCol="0">
+            <a:spAutoFit/>
+          </a:bodyPr>
+          <a:lstStyle/>
+          <a:p>
+            <a:r>
+              <a:rPr kumimoji="1" lang="en-US" altLang="ja-JP" dirty="0" smtClean="0"/>
+              <a:t>(2)</a:t>
+            </a:r>
+            <a:endParaRPr kumimoji="1" lang="ja-JP" altLang="en-US" dirty="0"/>
+          </a:p>
+        </p:txBody>
+      </p:sp>
       <p:cxnSp>
         <p:nvCxnSpPr>
-          <p:cNvPr id="31" name="直線矢印コネクタ 30"/>
+          <p:cNvPr id="6" name="直線矢印コネクタ 5"/>
           <p:cNvCxnSpPr>
-            <a:stCxn id="74" idx="1"/>
+            <a:stCxn id="4" idx="2"/>
+            <a:endCxn id="17" idx="0"/>
           </p:cNvCxnSpPr>
           <p:nvPr/>
         </p:nvCxnSpPr>
         <p:spPr>
           <a:xfrm flipH="1">
-            <a:off x="3206816" y="2339419"/>
-            <a:ext cx="1605055" cy="912794"/>
+            <a:off x="2118730" y="1964499"/>
+            <a:ext cx="2" cy="468161"/>
           </a:xfrm>
           <a:prstGeom prst="straightConnector1">
             <a:avLst/>
           </a:prstGeom>
-          <a:ln w="9525">
-            <a:prstDash val="dash"/>
-            <a:headEnd type="none"/>
+          <a:ln>
+            <a:headEnd type="arrow"/>
             <a:tailEnd type="arrow"/>
           </a:ln>
         </p:spPr>
@@ -7637,78 +7659,211 @@
           </a:fontRef>
         </p:style>
       </p:cxnSp>
-      <p:cxnSp>
-        <p:nvCxnSpPr>
-          <p:cNvPr id="35" name="直線矢印コネクタ 34"/>
-          <p:cNvCxnSpPr/>
-          <p:nvPr/>
-        </p:nvCxnSpPr>
-        <p:spPr>
-          <a:xfrm flipH="1">
-            <a:off x="3179618" y="3666259"/>
-            <a:ext cx="1630020" cy="22514"/>
-          </a:xfrm>
-          <a:prstGeom prst="straightConnector1">
-            <a:avLst/>
-          </a:prstGeom>
-          <a:ln w="9525">
-            <a:prstDash val="dash"/>
-            <a:headEnd type="none"/>
-            <a:tailEnd type="arrow"/>
+      <p:sp>
+        <p:nvSpPr>
+          <p:cNvPr id="10" name="正方形/長方形 9"/>
+          <p:cNvSpPr/>
+          <p:nvPr/>
+        </p:nvSpPr>
+        <p:spPr>
+          <a:xfrm>
+            <a:off x="4917688" y="1529516"/>
+            <a:ext cx="3044283" cy="1723756"/>
+          </a:xfrm>
+          <a:prstGeom prst="rect">
+            <a:avLst/>
+          </a:prstGeom>
+          <a:noFill/>
+          <a:ln w="41275">
+            <a:solidFill>
+              <a:srgbClr val="6194C7"/>
+            </a:solidFill>
           </a:ln>
+        </p:spPr>
+        <p:style>
+          <a:lnRef idx="1">
+            <a:schemeClr val="accent1"/>
+          </a:lnRef>
+          <a:fillRef idx="3">
+            <a:schemeClr val="accent1"/>
+          </a:fillRef>
+          <a:effectRef idx="2">
+            <a:schemeClr val="accent1"/>
+          </a:effectRef>
+          <a:fontRef idx="minor">
+            <a:schemeClr val="lt1"/>
+          </a:fontRef>
+        </p:style>
+        <p:txBody>
+          <a:bodyPr rtlCol="0" anchor="ctr"/>
+          <a:lstStyle/>
+          <a:p>
+            <a:pPr algn="ctr"/>
+            <a:endParaRPr kumimoji="1" lang="ja-JP" altLang="en-US"/>
+          </a:p>
+        </p:txBody>
+      </p:sp>
+      <p:sp>
+        <p:nvSpPr>
+          <p:cNvPr id="19" name="正方形/長方形 18"/>
+          <p:cNvSpPr/>
+          <p:nvPr/>
+        </p:nvSpPr>
+        <p:spPr>
+          <a:xfrm>
+            <a:off x="579860" y="4357650"/>
+            <a:ext cx="3077737" cy="820612"/>
+          </a:xfrm>
+          <a:prstGeom prst="rect">
+            <a:avLst/>
+          </a:prstGeom>
         </p:spPr>
         <p:style>
           <a:lnRef idx="2">
             <a:schemeClr val="accent1"/>
           </a:lnRef>
-          <a:fillRef idx="0">
-            <a:schemeClr val="accent1"/>
+          <a:fillRef idx="1">
+            <a:schemeClr val="lt1"/>
           </a:fillRef>
-          <a:effectRef idx="1">
+          <a:effectRef idx="0">
             <a:schemeClr val="accent1"/>
           </a:effectRef>
           <a:fontRef idx="minor">
-            <a:schemeClr val="tx1"/>
+            <a:schemeClr val="dk1"/>
           </a:fontRef>
         </p:style>
-      </p:cxnSp>
-      <p:cxnSp>
-        <p:nvCxnSpPr>
-          <p:cNvPr id="63" name="直線矢印コネクタ 62"/>
-          <p:cNvCxnSpPr>
-            <a:stCxn id="4" idx="2"/>
-            <a:endCxn id="24" idx="0"/>
-          </p:cNvCxnSpPr>
-          <p:nvPr/>
-        </p:nvCxnSpPr>
-        <p:spPr>
-          <a:xfrm>
-            <a:off x="1961042" y="2719822"/>
-            <a:ext cx="0" cy="387059"/>
-          </a:xfrm>
-          <a:prstGeom prst="straightConnector1">
-            <a:avLst/>
-          </a:prstGeom>
-          <a:ln>
-            <a:headEnd type="arrow"/>
-            <a:tailEnd type="arrow"/>
-          </a:ln>
+        <p:txBody>
+          <a:bodyPr rtlCol="0" anchor="t" anchorCtr="1"/>
+          <a:lstStyle/>
+          <a:p>
+            <a:pPr algn="ctr"/>
+            <a:endParaRPr lang="en-US" altLang="ja-JP" sz="1600" b="1" dirty="0" smtClean="0"/>
+          </a:p>
+        </p:txBody>
+      </p:sp>
+      <p:sp>
+        <p:nvSpPr>
+          <p:cNvPr id="31" name="角丸四角形 30"/>
+          <p:cNvSpPr/>
+          <p:nvPr/>
+        </p:nvSpPr>
+        <p:spPr>
+          <a:xfrm>
+            <a:off x="1728292" y="4736057"/>
+            <a:ext cx="753597" cy="194054"/>
+          </a:xfrm>
+          <a:prstGeom prst="roundRect">
+            <a:avLst/>
+          </a:prstGeom>
         </p:spPr>
         <p:style>
-          <a:lnRef idx="2">
+          <a:lnRef idx="1">
             <a:schemeClr val="accent1"/>
           </a:lnRef>
-          <a:fillRef idx="0">
+          <a:fillRef idx="3">
             <a:schemeClr val="accent1"/>
           </a:fillRef>
-          <a:effectRef idx="1">
+          <a:effectRef idx="2">
             <a:schemeClr val="accent1"/>
           </a:effectRef>
           <a:fontRef idx="minor">
-            <a:schemeClr val="tx1"/>
+            <a:schemeClr val="lt1"/>
           </a:fontRef>
         </p:style>
-      </p:cxnSp>
+        <p:txBody>
+          <a:bodyPr rtlCol="0" anchor="ctr" anchorCtr="1"/>
+          <a:lstStyle/>
+          <a:p>
+            <a:pPr algn="ctr"/>
+            <a:r>
+              <a:rPr lang="ja-JP" altLang="en-US" sz="800" dirty="0">
+                <a:solidFill>
+                  <a:prstClr val="white"/>
+                </a:solidFill>
+              </a:rPr>
+              <a:t>戻</a:t>
+            </a:r>
+            <a:r>
+              <a:rPr lang="ja-JP" altLang="en-US" sz="800" dirty="0" smtClean="0">
+                <a:solidFill>
+                  <a:prstClr val="white"/>
+                </a:solidFill>
+              </a:rPr>
+              <a:t>る</a:t>
+            </a:r>
+            <a:endParaRPr lang="ja-JP" altLang="en-US" sz="800" dirty="0">
+              <a:solidFill>
+                <a:prstClr val="white"/>
+              </a:solidFill>
+            </a:endParaRPr>
+          </a:p>
+        </p:txBody>
+      </p:sp>
+      <p:sp>
+        <p:nvSpPr>
+          <p:cNvPr id="8" name="上下矢印 7"/>
+          <p:cNvSpPr/>
+          <p:nvPr/>
+        </p:nvSpPr>
+        <p:spPr>
+          <a:xfrm>
+            <a:off x="1934370" y="3253273"/>
+            <a:ext cx="368724" cy="585085"/>
+          </a:xfrm>
+          <a:prstGeom prst="upDownArrow">
+            <a:avLst>
+              <a:gd name="adj1" fmla="val 50000"/>
+              <a:gd name="adj2" fmla="val 36948"/>
+            </a:avLst>
+          </a:prstGeom>
+          <a:gradFill>
+            <a:gsLst>
+              <a:gs pos="0">
+                <a:schemeClr val="accent1">
+                  <a:tint val="100000"/>
+                  <a:shade val="100000"/>
+                  <a:satMod val="130000"/>
+                </a:schemeClr>
+              </a:gs>
+              <a:gs pos="100000">
+                <a:schemeClr val="accent1">
+                  <a:tint val="50000"/>
+                  <a:shade val="100000"/>
+                  <a:satMod val="350000"/>
+                </a:schemeClr>
+              </a:gs>
+            </a:gsLst>
+            <a:path path="circle">
+              <a:fillToRect l="100000" t="100000"/>
+            </a:path>
+          </a:gradFill>
+          <a:ln w="41275">
+            <a:noFill/>
+          </a:ln>
+        </p:spPr>
+        <p:style>
+          <a:lnRef idx="1">
+            <a:schemeClr val="accent1"/>
+          </a:lnRef>
+          <a:fillRef idx="3">
+            <a:schemeClr val="accent1"/>
+          </a:fillRef>
+          <a:effectRef idx="2">
+            <a:schemeClr val="accent1"/>
+          </a:effectRef>
+          <a:fontRef idx="minor">
+            <a:schemeClr val="lt1"/>
+          </a:fontRef>
+        </p:style>
+        <p:txBody>
+          <a:bodyPr rtlCol="0" anchor="ctr"/>
+          <a:lstStyle/>
+          <a:p>
+            <a:pPr algn="ctr"/>
+            <a:endParaRPr kumimoji="1" lang="ja-JP" altLang="en-US"/>
+          </a:p>
+        </p:txBody>
+      </p:sp>
     </p:spTree>
     <p:extLst>
       <p:ext uri="{BB962C8B-B14F-4D97-AF65-F5344CB8AC3E}">

</xml_diff>